<commit_message>
added stack current visulaization
</commit_message>
<xml_diff>
--- a/Test_results/Test_case_1_week.pptx
+++ b/Test_results/Test_case_1_week.pptx
@@ -2,12 +2,17 @@
 <file path=ppt/presentation.xml><?xml version="1.0" encoding="utf-8"?>
 <p:presentation xmlns:a="http://schemas.openxmlformats.org/drawingml/2006/main" xmlns:r="http://schemas.openxmlformats.org/officeDocument/2006/relationships" xmlns:p="http://schemas.openxmlformats.org/presentationml/2006/main" saveSubsetFonts="1">
   <p:sldMasterIdLst>
-    <p:sldMasterId id="2147483648" r:id="rId1"/>
+    <p:sldMasterId id="2147483660" r:id="rId1"/>
+    <p:sldMasterId id="2147483648" r:id="rId2"/>
   </p:sldMasterIdLst>
+  <p:notesMasterIdLst>
+    <p:notesMasterId r:id="rId7"/>
+  </p:notesMasterIdLst>
   <p:sldIdLst>
-    <p:sldId id="256" r:id="rId2"/>
-    <p:sldId id="257" r:id="rId3"/>
-    <p:sldId id="258" r:id="rId4"/>
+    <p:sldId id="260" r:id="rId3"/>
+    <p:sldId id="298" r:id="rId4"/>
+    <p:sldId id="300" r:id="rId5"/>
+    <p:sldId id="299" r:id="rId6"/>
   </p:sldIdLst>
   <p:sldSz cx="12192000" cy="6858000"/>
   <p:notesSz cx="6858000" cy="9144000"/>
@@ -106,7 +111,614 @@
       </a:defRPr>
     </a:lvl9pPr>
   </p:defaultTextStyle>
+  <p:extLst>
+    <p:ext uri="{EFAFB233-063F-42B5-8137-9DF3F51BA10A}">
+      <p15:sldGuideLst xmlns:p15="http://schemas.microsoft.com/office/powerpoint/2012/main"/>
+    </p:ext>
+  </p:extLst>
 </p:presentation>
+</file>
+
+<file path=ppt/notesMasters/notesMaster1.xml><?xml version="1.0" encoding="utf-8"?>
+<p:notesMaster xmlns:a="http://schemas.openxmlformats.org/drawingml/2006/main" xmlns:r="http://schemas.openxmlformats.org/officeDocument/2006/relationships" xmlns:p="http://schemas.openxmlformats.org/presentationml/2006/main">
+  <p:cSld>
+    <p:bg>
+      <p:bgRef idx="1001">
+        <a:schemeClr val="bg1"/>
+      </p:bgRef>
+    </p:bg>
+    <p:spTree>
+      <p:nvGrpSpPr>
+        <p:cNvPr id="1" name=""/>
+        <p:cNvGrpSpPr/>
+        <p:nvPr/>
+      </p:nvGrpSpPr>
+      <p:grpSpPr>
+        <a:xfrm>
+          <a:off x="0" y="0"/>
+          <a:ext cx="0" cy="0"/>
+          <a:chOff x="0" y="0"/>
+          <a:chExt cx="0" cy="0"/>
+        </a:xfrm>
+      </p:grpSpPr>
+      <p:sp>
+        <p:nvSpPr>
+          <p:cNvPr id="2" name="Header Placeholder 1"/>
+          <p:cNvSpPr>
+            <a:spLocks noGrp="1"/>
+          </p:cNvSpPr>
+          <p:nvPr>
+            <p:ph type="hdr" sz="quarter"/>
+          </p:nvPr>
+        </p:nvSpPr>
+        <p:spPr>
+          <a:xfrm>
+            <a:off x="0" y="0"/>
+            <a:ext cx="2971800" cy="458788"/>
+          </a:xfrm>
+          <a:prstGeom prst="rect">
+            <a:avLst/>
+          </a:prstGeom>
+        </p:spPr>
+        <p:txBody>
+          <a:bodyPr vert="horz" lIns="91440" tIns="45720" rIns="91440" bIns="45720" rtlCol="0"/>
+          <a:lstStyle>
+            <a:lvl1pPr algn="l">
+              <a:defRPr sz="1200"/>
+            </a:lvl1pPr>
+          </a:lstStyle>
+          <a:p>
+            <a:endParaRPr lang="en-SG"/>
+          </a:p>
+        </p:txBody>
+      </p:sp>
+      <p:sp>
+        <p:nvSpPr>
+          <p:cNvPr id="3" name="Date Placeholder 2"/>
+          <p:cNvSpPr>
+            <a:spLocks noGrp="1"/>
+          </p:cNvSpPr>
+          <p:nvPr>
+            <p:ph type="dt" idx="1"/>
+          </p:nvPr>
+        </p:nvSpPr>
+        <p:spPr>
+          <a:xfrm>
+            <a:off x="3884613" y="0"/>
+            <a:ext cx="2971800" cy="458788"/>
+          </a:xfrm>
+          <a:prstGeom prst="rect">
+            <a:avLst/>
+          </a:prstGeom>
+        </p:spPr>
+        <p:txBody>
+          <a:bodyPr vert="horz" lIns="91440" tIns="45720" rIns="91440" bIns="45720" rtlCol="0"/>
+          <a:lstStyle>
+            <a:lvl1pPr algn="r">
+              <a:defRPr sz="1200"/>
+            </a:lvl1pPr>
+          </a:lstStyle>
+          <a:p>
+            <a:fld id="{21C16D7F-4557-4BA3-A13A-FC48917AB332}" type="datetimeFigureOut">
+              <a:rPr lang="en-SG" smtClean="0"/>
+              <a:t>30/11/2021</a:t>
+            </a:fld>
+            <a:endParaRPr lang="en-SG"/>
+          </a:p>
+        </p:txBody>
+      </p:sp>
+      <p:sp>
+        <p:nvSpPr>
+          <p:cNvPr id="4" name="Slide Image Placeholder 3"/>
+          <p:cNvSpPr>
+            <a:spLocks noGrp="1" noRot="1" noChangeAspect="1"/>
+          </p:cNvSpPr>
+          <p:nvPr>
+            <p:ph type="sldImg" idx="2"/>
+          </p:nvPr>
+        </p:nvSpPr>
+        <p:spPr>
+          <a:xfrm>
+            <a:off x="685800" y="1143000"/>
+            <a:ext cx="5486400" cy="3086100"/>
+          </a:xfrm>
+          <a:prstGeom prst="rect">
+            <a:avLst/>
+          </a:prstGeom>
+          <a:noFill/>
+          <a:ln w="12700">
+            <a:solidFill>
+              <a:prstClr val="black"/>
+            </a:solidFill>
+          </a:ln>
+        </p:spPr>
+        <p:txBody>
+          <a:bodyPr vert="horz" lIns="91440" tIns="45720" rIns="91440" bIns="45720" rtlCol="0" anchor="ctr"/>
+          <a:lstStyle/>
+          <a:p>
+            <a:endParaRPr lang="en-SG"/>
+          </a:p>
+        </p:txBody>
+      </p:sp>
+      <p:sp>
+        <p:nvSpPr>
+          <p:cNvPr id="5" name="Notes Placeholder 4"/>
+          <p:cNvSpPr>
+            <a:spLocks noGrp="1"/>
+          </p:cNvSpPr>
+          <p:nvPr>
+            <p:ph type="body" sz="quarter" idx="3"/>
+          </p:nvPr>
+        </p:nvSpPr>
+        <p:spPr>
+          <a:xfrm>
+            <a:off x="685800" y="4400550"/>
+            <a:ext cx="5486400" cy="3600450"/>
+          </a:xfrm>
+          <a:prstGeom prst="rect">
+            <a:avLst/>
+          </a:prstGeom>
+        </p:spPr>
+        <p:txBody>
+          <a:bodyPr vert="horz" lIns="91440" tIns="45720" rIns="91440" bIns="45720" rtlCol="0"/>
+          <a:lstStyle/>
+          <a:p>
+            <a:pPr lvl="0"/>
+            <a:r>
+              <a:rPr lang="en-US"/>
+              <a:t>Click to edit Master text styles</a:t>
+            </a:r>
+          </a:p>
+          <a:p>
+            <a:pPr lvl="1"/>
+            <a:r>
+              <a:rPr lang="en-US"/>
+              <a:t>Second level</a:t>
+            </a:r>
+          </a:p>
+          <a:p>
+            <a:pPr lvl="2"/>
+            <a:r>
+              <a:rPr lang="en-US"/>
+              <a:t>Third level</a:t>
+            </a:r>
+          </a:p>
+          <a:p>
+            <a:pPr lvl="3"/>
+            <a:r>
+              <a:rPr lang="en-US"/>
+              <a:t>Fourth level</a:t>
+            </a:r>
+          </a:p>
+          <a:p>
+            <a:pPr lvl="4"/>
+            <a:r>
+              <a:rPr lang="en-US"/>
+              <a:t>Fifth level</a:t>
+            </a:r>
+            <a:endParaRPr lang="en-SG"/>
+          </a:p>
+        </p:txBody>
+      </p:sp>
+      <p:sp>
+        <p:nvSpPr>
+          <p:cNvPr id="6" name="Footer Placeholder 5"/>
+          <p:cNvSpPr>
+            <a:spLocks noGrp="1"/>
+          </p:cNvSpPr>
+          <p:nvPr>
+            <p:ph type="ftr" sz="quarter" idx="4"/>
+          </p:nvPr>
+        </p:nvSpPr>
+        <p:spPr>
+          <a:xfrm>
+            <a:off x="0" y="8685213"/>
+            <a:ext cx="2971800" cy="458787"/>
+          </a:xfrm>
+          <a:prstGeom prst="rect">
+            <a:avLst/>
+          </a:prstGeom>
+        </p:spPr>
+        <p:txBody>
+          <a:bodyPr vert="horz" lIns="91440" tIns="45720" rIns="91440" bIns="45720" rtlCol="0" anchor="b"/>
+          <a:lstStyle>
+            <a:lvl1pPr algn="l">
+              <a:defRPr sz="1200"/>
+            </a:lvl1pPr>
+          </a:lstStyle>
+          <a:p>
+            <a:endParaRPr lang="en-SG"/>
+          </a:p>
+        </p:txBody>
+      </p:sp>
+      <p:sp>
+        <p:nvSpPr>
+          <p:cNvPr id="7" name="Slide Number Placeholder 6"/>
+          <p:cNvSpPr>
+            <a:spLocks noGrp="1"/>
+          </p:cNvSpPr>
+          <p:nvPr>
+            <p:ph type="sldNum" sz="quarter" idx="5"/>
+          </p:nvPr>
+        </p:nvSpPr>
+        <p:spPr>
+          <a:xfrm>
+            <a:off x="3884613" y="8685213"/>
+            <a:ext cx="2971800" cy="458787"/>
+          </a:xfrm>
+          <a:prstGeom prst="rect">
+            <a:avLst/>
+          </a:prstGeom>
+        </p:spPr>
+        <p:txBody>
+          <a:bodyPr vert="horz" lIns="91440" tIns="45720" rIns="91440" bIns="45720" rtlCol="0" anchor="b"/>
+          <a:lstStyle>
+            <a:lvl1pPr algn="r">
+              <a:defRPr sz="1200"/>
+            </a:lvl1pPr>
+          </a:lstStyle>
+          <a:p>
+            <a:fld id="{4E50D0D1-B75F-4736-B71B-DCC61BC7D5AF}" type="slidenum">
+              <a:rPr lang="en-SG" smtClean="0"/>
+              <a:t>‹#›</a:t>
+            </a:fld>
+            <a:endParaRPr lang="en-SG"/>
+          </a:p>
+        </p:txBody>
+      </p:sp>
+    </p:spTree>
+    <p:extLst>
+      <p:ext uri="{BB962C8B-B14F-4D97-AF65-F5344CB8AC3E}">
+        <p14:creationId xmlns:p14="http://schemas.microsoft.com/office/powerpoint/2010/main" val="2717677009"/>
+      </p:ext>
+    </p:extLst>
+  </p:cSld>
+  <p:clrMap bg1="lt1" tx1="dk1" bg2="lt2" tx2="dk2" accent1="accent1" accent2="accent2" accent3="accent3" accent4="accent4" accent5="accent5" accent6="accent6" hlink="hlink" folHlink="folHlink"/>
+  <p:notesStyle>
+    <a:lvl1pPr marL="0" algn="l" defTabSz="914400" rtl="0" eaLnBrk="1" latinLnBrk="0" hangingPunct="1">
+      <a:defRPr sz="1200" kern="1200">
+        <a:solidFill>
+          <a:schemeClr val="tx1"/>
+        </a:solidFill>
+        <a:latin typeface="+mn-lt"/>
+        <a:ea typeface="+mn-ea"/>
+        <a:cs typeface="+mn-cs"/>
+      </a:defRPr>
+    </a:lvl1pPr>
+    <a:lvl2pPr marL="457200" algn="l" defTabSz="914400" rtl="0" eaLnBrk="1" latinLnBrk="0" hangingPunct="1">
+      <a:defRPr sz="1200" kern="1200">
+        <a:solidFill>
+          <a:schemeClr val="tx1"/>
+        </a:solidFill>
+        <a:latin typeface="+mn-lt"/>
+        <a:ea typeface="+mn-ea"/>
+        <a:cs typeface="+mn-cs"/>
+      </a:defRPr>
+    </a:lvl2pPr>
+    <a:lvl3pPr marL="914400" algn="l" defTabSz="914400" rtl="0" eaLnBrk="1" latinLnBrk="0" hangingPunct="1">
+      <a:defRPr sz="1200" kern="1200">
+        <a:solidFill>
+          <a:schemeClr val="tx1"/>
+        </a:solidFill>
+        <a:latin typeface="+mn-lt"/>
+        <a:ea typeface="+mn-ea"/>
+        <a:cs typeface="+mn-cs"/>
+      </a:defRPr>
+    </a:lvl3pPr>
+    <a:lvl4pPr marL="1371600" algn="l" defTabSz="914400" rtl="0" eaLnBrk="1" latinLnBrk="0" hangingPunct="1">
+      <a:defRPr sz="1200" kern="1200">
+        <a:solidFill>
+          <a:schemeClr val="tx1"/>
+        </a:solidFill>
+        <a:latin typeface="+mn-lt"/>
+        <a:ea typeface="+mn-ea"/>
+        <a:cs typeface="+mn-cs"/>
+      </a:defRPr>
+    </a:lvl4pPr>
+    <a:lvl5pPr marL="1828800" algn="l" defTabSz="914400" rtl="0" eaLnBrk="1" latinLnBrk="0" hangingPunct="1">
+      <a:defRPr sz="1200" kern="1200">
+        <a:solidFill>
+          <a:schemeClr val="tx1"/>
+        </a:solidFill>
+        <a:latin typeface="+mn-lt"/>
+        <a:ea typeface="+mn-ea"/>
+        <a:cs typeface="+mn-cs"/>
+      </a:defRPr>
+    </a:lvl5pPr>
+    <a:lvl6pPr marL="2286000" algn="l" defTabSz="914400" rtl="0" eaLnBrk="1" latinLnBrk="0" hangingPunct="1">
+      <a:defRPr sz="1200" kern="1200">
+        <a:solidFill>
+          <a:schemeClr val="tx1"/>
+        </a:solidFill>
+        <a:latin typeface="+mn-lt"/>
+        <a:ea typeface="+mn-ea"/>
+        <a:cs typeface="+mn-cs"/>
+      </a:defRPr>
+    </a:lvl6pPr>
+    <a:lvl7pPr marL="2743200" algn="l" defTabSz="914400" rtl="0" eaLnBrk="1" latinLnBrk="0" hangingPunct="1">
+      <a:defRPr sz="1200" kern="1200">
+        <a:solidFill>
+          <a:schemeClr val="tx1"/>
+        </a:solidFill>
+        <a:latin typeface="+mn-lt"/>
+        <a:ea typeface="+mn-ea"/>
+        <a:cs typeface="+mn-cs"/>
+      </a:defRPr>
+    </a:lvl7pPr>
+    <a:lvl8pPr marL="3200400" algn="l" defTabSz="914400" rtl="0" eaLnBrk="1" latinLnBrk="0" hangingPunct="1">
+      <a:defRPr sz="1200" kern="1200">
+        <a:solidFill>
+          <a:schemeClr val="tx1"/>
+        </a:solidFill>
+        <a:latin typeface="+mn-lt"/>
+        <a:ea typeface="+mn-ea"/>
+        <a:cs typeface="+mn-cs"/>
+      </a:defRPr>
+    </a:lvl8pPr>
+    <a:lvl9pPr marL="3657600" algn="l" defTabSz="914400" rtl="0" eaLnBrk="1" latinLnBrk="0" hangingPunct="1">
+      <a:defRPr sz="1200" kern="1200">
+        <a:solidFill>
+          <a:schemeClr val="tx1"/>
+        </a:solidFill>
+        <a:latin typeface="+mn-lt"/>
+        <a:ea typeface="+mn-ea"/>
+        <a:cs typeface="+mn-cs"/>
+      </a:defRPr>
+    </a:lvl9pPr>
+  </p:notesStyle>
+</p:notesMaster>
+</file>
+
+<file path=ppt/notesSlides/notesSlide1.xml><?xml version="1.0" encoding="utf-8"?>
+<p:notes xmlns:a="http://schemas.openxmlformats.org/drawingml/2006/main" xmlns:r="http://schemas.openxmlformats.org/officeDocument/2006/relationships" xmlns:p="http://schemas.openxmlformats.org/presentationml/2006/main">
+  <p:cSld>
+    <p:spTree>
+      <p:nvGrpSpPr>
+        <p:cNvPr id="1" name=""/>
+        <p:cNvGrpSpPr/>
+        <p:nvPr/>
+      </p:nvGrpSpPr>
+      <p:grpSpPr>
+        <a:xfrm>
+          <a:off x="0" y="0"/>
+          <a:ext cx="0" cy="0"/>
+          <a:chOff x="0" y="0"/>
+          <a:chExt cx="0" cy="0"/>
+        </a:xfrm>
+      </p:grpSpPr>
+      <p:sp>
+        <p:nvSpPr>
+          <p:cNvPr id="2" name="Slide Image Placeholder 1"/>
+          <p:cNvSpPr>
+            <a:spLocks noGrp="1" noRot="1" noChangeAspect="1"/>
+          </p:cNvSpPr>
+          <p:nvPr>
+            <p:ph type="sldImg"/>
+          </p:nvPr>
+        </p:nvSpPr>
+        <p:spPr/>
+      </p:sp>
+      <p:sp>
+        <p:nvSpPr>
+          <p:cNvPr id="3" name="Notes Placeholder 2"/>
+          <p:cNvSpPr>
+            <a:spLocks noGrp="1"/>
+          </p:cNvSpPr>
+          <p:nvPr>
+            <p:ph type="body" idx="1"/>
+          </p:nvPr>
+        </p:nvSpPr>
+        <p:spPr/>
+        <p:txBody>
+          <a:bodyPr/>
+          <a:lstStyle/>
+          <a:p>
+            <a:endParaRPr lang="en-SG" dirty="0"/>
+          </a:p>
+        </p:txBody>
+      </p:sp>
+      <p:sp>
+        <p:nvSpPr>
+          <p:cNvPr id="4" name="Slide Number Placeholder 3"/>
+          <p:cNvSpPr>
+            <a:spLocks noGrp="1"/>
+          </p:cNvSpPr>
+          <p:nvPr>
+            <p:ph type="sldNum" sz="quarter" idx="5"/>
+          </p:nvPr>
+        </p:nvSpPr>
+        <p:spPr/>
+        <p:txBody>
+          <a:bodyPr/>
+          <a:lstStyle/>
+          <a:p>
+            <a:fld id="{79653C64-50B1-414F-9C9F-647C478E6C9C}" type="slidenum">
+              <a:rPr lang="en-US" smtClean="0"/>
+              <a:t>2</a:t>
+            </a:fld>
+            <a:endParaRPr lang="en-US"/>
+          </a:p>
+        </p:txBody>
+      </p:sp>
+    </p:spTree>
+    <p:extLst>
+      <p:ext uri="{BB962C8B-B14F-4D97-AF65-F5344CB8AC3E}">
+        <p14:creationId xmlns:p14="http://schemas.microsoft.com/office/powerpoint/2010/main" val="52167919"/>
+      </p:ext>
+    </p:extLst>
+  </p:cSld>
+  <p:clrMapOvr>
+    <a:masterClrMapping/>
+  </p:clrMapOvr>
+</p:notes>
+</file>
+
+<file path=ppt/notesSlides/notesSlide2.xml><?xml version="1.0" encoding="utf-8"?>
+<p:notes xmlns:a="http://schemas.openxmlformats.org/drawingml/2006/main" xmlns:r="http://schemas.openxmlformats.org/officeDocument/2006/relationships" xmlns:p="http://schemas.openxmlformats.org/presentationml/2006/main">
+  <p:cSld>
+    <p:spTree>
+      <p:nvGrpSpPr>
+        <p:cNvPr id="1" name=""/>
+        <p:cNvGrpSpPr/>
+        <p:nvPr/>
+      </p:nvGrpSpPr>
+      <p:grpSpPr>
+        <a:xfrm>
+          <a:off x="0" y="0"/>
+          <a:ext cx="0" cy="0"/>
+          <a:chOff x="0" y="0"/>
+          <a:chExt cx="0" cy="0"/>
+        </a:xfrm>
+      </p:grpSpPr>
+      <p:sp>
+        <p:nvSpPr>
+          <p:cNvPr id="2" name="Slide Image Placeholder 1"/>
+          <p:cNvSpPr>
+            <a:spLocks noGrp="1" noRot="1" noChangeAspect="1"/>
+          </p:cNvSpPr>
+          <p:nvPr>
+            <p:ph type="sldImg"/>
+          </p:nvPr>
+        </p:nvSpPr>
+        <p:spPr/>
+      </p:sp>
+      <p:sp>
+        <p:nvSpPr>
+          <p:cNvPr id="3" name="Notes Placeholder 2"/>
+          <p:cNvSpPr>
+            <a:spLocks noGrp="1"/>
+          </p:cNvSpPr>
+          <p:nvPr>
+            <p:ph type="body" idx="1"/>
+          </p:nvPr>
+        </p:nvSpPr>
+        <p:spPr/>
+        <p:txBody>
+          <a:bodyPr/>
+          <a:lstStyle/>
+          <a:p>
+            <a:endParaRPr lang="en-SG" dirty="0"/>
+          </a:p>
+        </p:txBody>
+      </p:sp>
+      <p:sp>
+        <p:nvSpPr>
+          <p:cNvPr id="4" name="Slide Number Placeholder 3"/>
+          <p:cNvSpPr>
+            <a:spLocks noGrp="1"/>
+          </p:cNvSpPr>
+          <p:nvPr>
+            <p:ph type="sldNum" sz="quarter" idx="5"/>
+          </p:nvPr>
+        </p:nvSpPr>
+        <p:spPr/>
+        <p:txBody>
+          <a:bodyPr/>
+          <a:lstStyle/>
+          <a:p>
+            <a:fld id="{79653C64-50B1-414F-9C9F-647C478E6C9C}" type="slidenum">
+              <a:rPr lang="en-US" smtClean="0"/>
+              <a:t>3</a:t>
+            </a:fld>
+            <a:endParaRPr lang="en-US"/>
+          </a:p>
+        </p:txBody>
+      </p:sp>
+    </p:spTree>
+    <p:extLst>
+      <p:ext uri="{BB962C8B-B14F-4D97-AF65-F5344CB8AC3E}">
+        <p14:creationId xmlns:p14="http://schemas.microsoft.com/office/powerpoint/2010/main" val="3108564809"/>
+      </p:ext>
+    </p:extLst>
+  </p:cSld>
+  <p:clrMapOvr>
+    <a:masterClrMapping/>
+  </p:clrMapOvr>
+</p:notes>
+</file>
+
+<file path=ppt/notesSlides/notesSlide3.xml><?xml version="1.0" encoding="utf-8"?>
+<p:notes xmlns:a="http://schemas.openxmlformats.org/drawingml/2006/main" xmlns:r="http://schemas.openxmlformats.org/officeDocument/2006/relationships" xmlns:p="http://schemas.openxmlformats.org/presentationml/2006/main">
+  <p:cSld>
+    <p:spTree>
+      <p:nvGrpSpPr>
+        <p:cNvPr id="1" name=""/>
+        <p:cNvGrpSpPr/>
+        <p:nvPr/>
+      </p:nvGrpSpPr>
+      <p:grpSpPr>
+        <a:xfrm>
+          <a:off x="0" y="0"/>
+          <a:ext cx="0" cy="0"/>
+          <a:chOff x="0" y="0"/>
+          <a:chExt cx="0" cy="0"/>
+        </a:xfrm>
+      </p:grpSpPr>
+      <p:sp>
+        <p:nvSpPr>
+          <p:cNvPr id="2" name="Slide Image Placeholder 1"/>
+          <p:cNvSpPr>
+            <a:spLocks noGrp="1" noRot="1" noChangeAspect="1"/>
+          </p:cNvSpPr>
+          <p:nvPr>
+            <p:ph type="sldImg"/>
+          </p:nvPr>
+        </p:nvSpPr>
+        <p:spPr/>
+      </p:sp>
+      <p:sp>
+        <p:nvSpPr>
+          <p:cNvPr id="3" name="Notes Placeholder 2"/>
+          <p:cNvSpPr>
+            <a:spLocks noGrp="1"/>
+          </p:cNvSpPr>
+          <p:nvPr>
+            <p:ph type="body" idx="1"/>
+          </p:nvPr>
+        </p:nvSpPr>
+        <p:spPr/>
+        <p:txBody>
+          <a:bodyPr/>
+          <a:lstStyle/>
+          <a:p>
+            <a:endParaRPr lang="en-SG" dirty="0"/>
+          </a:p>
+        </p:txBody>
+      </p:sp>
+      <p:sp>
+        <p:nvSpPr>
+          <p:cNvPr id="4" name="Slide Number Placeholder 3"/>
+          <p:cNvSpPr>
+            <a:spLocks noGrp="1"/>
+          </p:cNvSpPr>
+          <p:nvPr>
+            <p:ph type="sldNum" sz="quarter" idx="5"/>
+          </p:nvPr>
+        </p:nvSpPr>
+        <p:spPr/>
+        <p:txBody>
+          <a:bodyPr/>
+          <a:lstStyle/>
+          <a:p>
+            <a:fld id="{79653C64-50B1-414F-9C9F-647C478E6C9C}" type="slidenum">
+              <a:rPr lang="en-US" smtClean="0"/>
+              <a:t>4</a:t>
+            </a:fld>
+            <a:endParaRPr lang="en-US"/>
+          </a:p>
+        </p:txBody>
+      </p:sp>
+    </p:spTree>
+    <p:extLst>
+      <p:ext uri="{BB962C8B-B14F-4D97-AF65-F5344CB8AC3E}">
+        <p14:creationId xmlns:p14="http://schemas.microsoft.com/office/powerpoint/2010/main" val="3172181419"/>
+      </p:ext>
+    </p:extLst>
+  </p:cSld>
+  <p:clrMapOvr>
+    <a:masterClrMapping/>
+  </p:clrMapOvr>
+</p:notes>
 </file>
 
 <file path=ppt/slideLayouts/slideLayout1.xml><?xml version="1.0" encoding="utf-8"?>
@@ -732,6 +1344,246 @@
     <p:extLst>
       <p:ext uri="{BB962C8B-B14F-4D97-AF65-F5344CB8AC3E}">
         <p14:creationId xmlns:p14="http://schemas.microsoft.com/office/powerpoint/2010/main" val="2521447871"/>
+      </p:ext>
+    </p:extLst>
+  </p:cSld>
+  <p:clrMapOvr>
+    <a:masterClrMapping/>
+  </p:clrMapOvr>
+</p:sldLayout>
+</file>
+
+<file path=ppt/slideLayouts/slideLayout12.xml><?xml version="1.0" encoding="utf-8"?>
+<p:sldLayout xmlns:a="http://schemas.openxmlformats.org/drawingml/2006/main" xmlns:r="http://schemas.openxmlformats.org/officeDocument/2006/relationships" xmlns:p="http://schemas.openxmlformats.org/presentationml/2006/main" type="title" preserve="1">
+  <p:cSld name="Title Slide">
+    <p:spTree>
+      <p:nvGrpSpPr>
+        <p:cNvPr id="1" name=""/>
+        <p:cNvGrpSpPr/>
+        <p:nvPr/>
+      </p:nvGrpSpPr>
+      <p:grpSpPr>
+        <a:xfrm>
+          <a:off x="0" y="0"/>
+          <a:ext cx="0" cy="0"/>
+          <a:chOff x="0" y="0"/>
+          <a:chExt cx="0" cy="0"/>
+        </a:xfrm>
+      </p:grpSpPr>
+      <p:sp>
+        <p:nvSpPr>
+          <p:cNvPr id="2" name="Title 1"/>
+          <p:cNvSpPr>
+            <a:spLocks noGrp="1"/>
+          </p:cNvSpPr>
+          <p:nvPr>
+            <p:ph type="ctrTitle"/>
+          </p:nvPr>
+        </p:nvSpPr>
+        <p:spPr>
+          <a:xfrm>
+            <a:off x="914400" y="2130426"/>
+            <a:ext cx="10363200" cy="1470025"/>
+          </a:xfrm>
+        </p:spPr>
+        <p:txBody>
+          <a:bodyPr/>
+          <a:lstStyle/>
+          <a:p>
+            <a:r>
+              <a:rPr lang="en-US" dirty="0"/>
+              <a:t>Click to edit Master title style</a:t>
+            </a:r>
+          </a:p>
+        </p:txBody>
+      </p:sp>
+      <p:sp>
+        <p:nvSpPr>
+          <p:cNvPr id="3" name="Subtitle 2"/>
+          <p:cNvSpPr>
+            <a:spLocks noGrp="1"/>
+          </p:cNvSpPr>
+          <p:nvPr>
+            <p:ph type="subTitle" idx="1"/>
+          </p:nvPr>
+        </p:nvSpPr>
+        <p:spPr>
+          <a:xfrm>
+            <a:off x="1828800" y="3886200"/>
+            <a:ext cx="8534400" cy="1752600"/>
+          </a:xfrm>
+        </p:spPr>
+        <p:txBody>
+          <a:bodyPr/>
+          <a:lstStyle>
+            <a:lvl1pPr marL="0" indent="0" algn="ctr">
+              <a:buNone/>
+              <a:defRPr>
+                <a:solidFill>
+                  <a:schemeClr val="tx1">
+                    <a:tint val="75000"/>
+                  </a:schemeClr>
+                </a:solidFill>
+              </a:defRPr>
+            </a:lvl1pPr>
+            <a:lvl2pPr marL="609585" indent="0" algn="ctr">
+              <a:buNone/>
+              <a:defRPr>
+                <a:solidFill>
+                  <a:schemeClr val="tx1">
+                    <a:tint val="75000"/>
+                  </a:schemeClr>
+                </a:solidFill>
+              </a:defRPr>
+            </a:lvl2pPr>
+            <a:lvl3pPr marL="1219170" indent="0" algn="ctr">
+              <a:buNone/>
+              <a:defRPr>
+                <a:solidFill>
+                  <a:schemeClr val="tx1">
+                    <a:tint val="75000"/>
+                  </a:schemeClr>
+                </a:solidFill>
+              </a:defRPr>
+            </a:lvl3pPr>
+            <a:lvl4pPr marL="1828754" indent="0" algn="ctr">
+              <a:buNone/>
+              <a:defRPr>
+                <a:solidFill>
+                  <a:schemeClr val="tx1">
+                    <a:tint val="75000"/>
+                  </a:schemeClr>
+                </a:solidFill>
+              </a:defRPr>
+            </a:lvl4pPr>
+            <a:lvl5pPr marL="2438339" indent="0" algn="ctr">
+              <a:buNone/>
+              <a:defRPr>
+                <a:solidFill>
+                  <a:schemeClr val="tx1">
+                    <a:tint val="75000"/>
+                  </a:schemeClr>
+                </a:solidFill>
+              </a:defRPr>
+            </a:lvl5pPr>
+            <a:lvl6pPr marL="3047924" indent="0" algn="ctr">
+              <a:buNone/>
+              <a:defRPr>
+                <a:solidFill>
+                  <a:schemeClr val="tx1">
+                    <a:tint val="75000"/>
+                  </a:schemeClr>
+                </a:solidFill>
+              </a:defRPr>
+            </a:lvl6pPr>
+            <a:lvl7pPr marL="3657509" indent="0" algn="ctr">
+              <a:buNone/>
+              <a:defRPr>
+                <a:solidFill>
+                  <a:schemeClr val="tx1">
+                    <a:tint val="75000"/>
+                  </a:schemeClr>
+                </a:solidFill>
+              </a:defRPr>
+            </a:lvl7pPr>
+            <a:lvl8pPr marL="4267093" indent="0" algn="ctr">
+              <a:buNone/>
+              <a:defRPr>
+                <a:solidFill>
+                  <a:schemeClr val="tx1">
+                    <a:tint val="75000"/>
+                  </a:schemeClr>
+                </a:solidFill>
+              </a:defRPr>
+            </a:lvl8pPr>
+            <a:lvl9pPr marL="4876678" indent="0" algn="ctr">
+              <a:buNone/>
+              <a:defRPr>
+                <a:solidFill>
+                  <a:schemeClr val="tx1">
+                    <a:tint val="75000"/>
+                  </a:schemeClr>
+                </a:solidFill>
+              </a:defRPr>
+            </a:lvl9pPr>
+          </a:lstStyle>
+          <a:p>
+            <a:r>
+              <a:rPr lang="en-US"/>
+              <a:t>Click to edit Master subtitle style</a:t>
+            </a:r>
+          </a:p>
+        </p:txBody>
+      </p:sp>
+      <p:sp>
+        <p:nvSpPr>
+          <p:cNvPr id="4" name="Date Placeholder 3"/>
+          <p:cNvSpPr>
+            <a:spLocks noGrp="1"/>
+          </p:cNvSpPr>
+          <p:nvPr>
+            <p:ph type="dt" sz="half" idx="10"/>
+          </p:nvPr>
+        </p:nvSpPr>
+        <p:spPr/>
+        <p:txBody>
+          <a:bodyPr/>
+          <a:lstStyle/>
+          <a:p>
+            <a:fld id="{9F1CC899-6CEC-9548-B06D-7E1EB6F78CA3}" type="datetimeFigureOut">
+              <a:rPr lang="en-US" smtClean="0"/>
+              <a:t>11/30/2021</a:t>
+            </a:fld>
+            <a:endParaRPr lang="en-US"/>
+          </a:p>
+        </p:txBody>
+      </p:sp>
+      <p:sp>
+        <p:nvSpPr>
+          <p:cNvPr id="5" name="Footer Placeholder 4"/>
+          <p:cNvSpPr>
+            <a:spLocks noGrp="1"/>
+          </p:cNvSpPr>
+          <p:nvPr>
+            <p:ph type="ftr" sz="quarter" idx="11"/>
+          </p:nvPr>
+        </p:nvSpPr>
+        <p:spPr/>
+        <p:txBody>
+          <a:bodyPr/>
+          <a:lstStyle/>
+          <a:p>
+            <a:endParaRPr lang="en-US"/>
+          </a:p>
+        </p:txBody>
+      </p:sp>
+      <p:sp>
+        <p:nvSpPr>
+          <p:cNvPr id="6" name="Slide Number Placeholder 5"/>
+          <p:cNvSpPr>
+            <a:spLocks noGrp="1"/>
+          </p:cNvSpPr>
+          <p:nvPr>
+            <p:ph type="sldNum" sz="quarter" idx="12"/>
+          </p:nvPr>
+        </p:nvSpPr>
+        <p:spPr/>
+        <p:txBody>
+          <a:bodyPr/>
+          <a:lstStyle/>
+          <a:p>
+            <a:fld id="{8E6562B1-0B0F-0246-9532-09536BC2AE59}" type="slidenum">
+              <a:rPr lang="en-US" smtClean="0"/>
+              <a:t>‹#›</a:t>
+            </a:fld>
+            <a:endParaRPr lang="en-US"/>
+          </a:p>
+        </p:txBody>
+      </p:sp>
+    </p:spTree>
+    <p:extLst>
+      <p:ext uri="{BB962C8B-B14F-4D97-AF65-F5344CB8AC3E}">
+        <p14:creationId xmlns:p14="http://schemas.microsoft.com/office/powerpoint/2010/main" val="3792405710"/>
       </p:ext>
     </p:extLst>
   </p:cSld>
@@ -3032,7 +3884,7 @@
   </p:cSld>
   <p:clrMap bg1="lt1" tx1="dk1" bg2="lt2" tx2="dk2" accent1="accent1" accent2="accent2" accent3="accent3" accent4="accent4" accent5="accent5" accent6="accent6" hlink="hlink" folHlink="folHlink"/>
   <p:sldLayoutIdLst>
-    <p:sldLayoutId id="2147483649" r:id="rId1"/>
+    <p:sldLayoutId id="2147483661" r:id="rId1"/>
     <p:sldLayoutId id="2147483650" r:id="rId2"/>
     <p:sldLayoutId id="2147483651" r:id="rId3"/>
     <p:sldLayoutId id="2147483652" r:id="rId4"/>
@@ -3327,9 +4179,14 @@
 </p:sldMaster>
 </file>
 
-<file path=ppt/slides/slide1.xml><?xml version="1.0" encoding="utf-8"?>
-<p:sld xmlns:a="http://schemas.openxmlformats.org/drawingml/2006/main" xmlns:r="http://schemas.openxmlformats.org/officeDocument/2006/relationships" xmlns:p="http://schemas.openxmlformats.org/presentationml/2006/main">
+<file path=ppt/slideMasters/slideMaster2.xml><?xml version="1.0" encoding="utf-8"?>
+<p:sldMaster xmlns:a="http://schemas.openxmlformats.org/drawingml/2006/main" xmlns:r="http://schemas.openxmlformats.org/officeDocument/2006/relationships" xmlns:p="http://schemas.openxmlformats.org/presentationml/2006/main">
   <p:cSld>
+    <p:bg>
+      <p:bgRef idx="1001">
+        <a:schemeClr val="bg1"/>
+      </p:bgRef>
+    </p:bg>
     <p:spTree>
       <p:nvGrpSpPr>
         <p:cNvPr id="1" name=""/>
@@ -3346,13 +4203,549 @@
       </p:grpSpPr>
       <p:sp>
         <p:nvSpPr>
-          <p:cNvPr id="2" name="Title 1">
-            <a:extLst>
-              <a:ext uri="{FF2B5EF4-FFF2-40B4-BE49-F238E27FC236}">
-                <a16:creationId xmlns:a16="http://schemas.microsoft.com/office/drawing/2014/main" id="{3B2ABB1E-CAFF-475A-B1EC-524262BBE45C}"/>
-              </a:ext>
-            </a:extLst>
-          </p:cNvPr>
+          <p:cNvPr id="2" name="Title Placeholder 1"/>
+          <p:cNvSpPr>
+            <a:spLocks noGrp="1"/>
+          </p:cNvSpPr>
+          <p:nvPr>
+            <p:ph type="title"/>
+          </p:nvPr>
+        </p:nvSpPr>
+        <p:spPr>
+          <a:xfrm>
+            <a:off x="609600" y="563632"/>
+            <a:ext cx="10972800" cy="1143000"/>
+          </a:xfrm>
+          <a:prstGeom prst="rect">
+            <a:avLst/>
+          </a:prstGeom>
+        </p:spPr>
+        <p:txBody>
+          <a:bodyPr vert="horz" lIns="91440" tIns="45720" rIns="91440" bIns="45720" rtlCol="0" anchor="ctr">
+            <a:normAutofit/>
+          </a:bodyPr>
+          <a:lstStyle/>
+          <a:p>
+            <a:r>
+              <a:rPr lang="en-US" dirty="0"/>
+              <a:t>Click to edit Master title style</a:t>
+            </a:r>
+          </a:p>
+        </p:txBody>
+      </p:sp>
+      <p:sp>
+        <p:nvSpPr>
+          <p:cNvPr id="3" name="Text Placeholder 2"/>
+          <p:cNvSpPr>
+            <a:spLocks noGrp="1"/>
+          </p:cNvSpPr>
+          <p:nvPr>
+            <p:ph type="body" idx="1"/>
+          </p:nvPr>
+        </p:nvSpPr>
+        <p:spPr>
+          <a:xfrm>
+            <a:off x="609600" y="1889195"/>
+            <a:ext cx="10972800" cy="3876123"/>
+          </a:xfrm>
+          <a:prstGeom prst="rect">
+            <a:avLst/>
+          </a:prstGeom>
+        </p:spPr>
+        <p:txBody>
+          <a:bodyPr vert="horz" lIns="91440" tIns="45720" rIns="91440" bIns="45720" rtlCol="0">
+            <a:normAutofit/>
+          </a:bodyPr>
+          <a:lstStyle/>
+          <a:p>
+            <a:pPr lvl="0"/>
+            <a:r>
+              <a:rPr lang="en-US" dirty="0"/>
+              <a:t>Click to edit Master text styles</a:t>
+            </a:r>
+          </a:p>
+          <a:p>
+            <a:pPr lvl="1"/>
+            <a:r>
+              <a:rPr lang="en-US" dirty="0"/>
+              <a:t>Second level</a:t>
+            </a:r>
+          </a:p>
+          <a:p>
+            <a:pPr lvl="2"/>
+            <a:r>
+              <a:rPr lang="en-US" dirty="0"/>
+              <a:t>Third level</a:t>
+            </a:r>
+          </a:p>
+          <a:p>
+            <a:pPr lvl="3"/>
+            <a:r>
+              <a:rPr lang="en-US" dirty="0"/>
+              <a:t>Fourth level</a:t>
+            </a:r>
+          </a:p>
+          <a:p>
+            <a:pPr lvl="4"/>
+            <a:r>
+              <a:rPr lang="en-US" dirty="0"/>
+              <a:t>Fifth level</a:t>
+            </a:r>
+          </a:p>
+        </p:txBody>
+      </p:sp>
+      <p:sp>
+        <p:nvSpPr>
+          <p:cNvPr id="4" name="Date Placeholder 3"/>
+          <p:cNvSpPr>
+            <a:spLocks noGrp="1"/>
+          </p:cNvSpPr>
+          <p:nvPr>
+            <p:ph type="dt" sz="half" idx="2"/>
+          </p:nvPr>
+        </p:nvSpPr>
+        <p:spPr>
+          <a:xfrm>
+            <a:off x="609600" y="5815374"/>
+            <a:ext cx="2844800" cy="365125"/>
+          </a:xfrm>
+          <a:prstGeom prst="rect">
+            <a:avLst/>
+          </a:prstGeom>
+        </p:spPr>
+        <p:txBody>
+          <a:bodyPr vert="horz" lIns="91440" tIns="45720" rIns="91440" bIns="45720" rtlCol="0" anchor="ctr"/>
+          <a:lstStyle>
+            <a:lvl1pPr algn="l">
+              <a:defRPr sz="1600">
+                <a:solidFill>
+                  <a:schemeClr val="tx1">
+                    <a:tint val="75000"/>
+                  </a:schemeClr>
+                </a:solidFill>
+                <a:latin typeface="Arial"/>
+              </a:defRPr>
+            </a:lvl1pPr>
+          </a:lstStyle>
+          <a:p>
+            <a:fld id="{9F1CC899-6CEC-9548-B06D-7E1EB6F78CA3}" type="datetimeFigureOut">
+              <a:rPr lang="en-US" smtClean="0"/>
+              <a:pPr/>
+              <a:t>11/30/2021</a:t>
+            </a:fld>
+            <a:endParaRPr lang="en-US" dirty="0"/>
+          </a:p>
+        </p:txBody>
+      </p:sp>
+      <p:sp>
+        <p:nvSpPr>
+          <p:cNvPr id="5" name="Footer Placeholder 4"/>
+          <p:cNvSpPr>
+            <a:spLocks noGrp="1"/>
+          </p:cNvSpPr>
+          <p:nvPr>
+            <p:ph type="ftr" sz="quarter" idx="3"/>
+          </p:nvPr>
+        </p:nvSpPr>
+        <p:spPr>
+          <a:xfrm>
+            <a:off x="4165600" y="5815374"/>
+            <a:ext cx="3860800" cy="365125"/>
+          </a:xfrm>
+          <a:prstGeom prst="rect">
+            <a:avLst/>
+          </a:prstGeom>
+        </p:spPr>
+        <p:txBody>
+          <a:bodyPr vert="horz" lIns="91440" tIns="45720" rIns="91440" bIns="45720" rtlCol="0" anchor="ctr"/>
+          <a:lstStyle>
+            <a:lvl1pPr algn="ctr">
+              <a:defRPr sz="1600">
+                <a:solidFill>
+                  <a:schemeClr val="tx1">
+                    <a:tint val="75000"/>
+                  </a:schemeClr>
+                </a:solidFill>
+                <a:latin typeface="Arial"/>
+              </a:defRPr>
+            </a:lvl1pPr>
+          </a:lstStyle>
+          <a:p>
+            <a:endParaRPr lang="en-US" dirty="0"/>
+          </a:p>
+        </p:txBody>
+      </p:sp>
+      <p:sp>
+        <p:nvSpPr>
+          <p:cNvPr id="6" name="Slide Number Placeholder 5"/>
+          <p:cNvSpPr>
+            <a:spLocks noGrp="1"/>
+          </p:cNvSpPr>
+          <p:nvPr>
+            <p:ph type="sldNum" sz="quarter" idx="4"/>
+          </p:nvPr>
+        </p:nvSpPr>
+        <p:spPr>
+          <a:xfrm>
+            <a:off x="8737600" y="5815374"/>
+            <a:ext cx="2844800" cy="365125"/>
+          </a:xfrm>
+          <a:prstGeom prst="rect">
+            <a:avLst/>
+          </a:prstGeom>
+        </p:spPr>
+        <p:txBody>
+          <a:bodyPr vert="horz" lIns="91440" tIns="45720" rIns="91440" bIns="45720" rtlCol="0" anchor="ctr"/>
+          <a:lstStyle>
+            <a:lvl1pPr algn="r">
+              <a:defRPr sz="1600" baseline="0">
+                <a:solidFill>
+                  <a:schemeClr val="tx1">
+                    <a:tint val="75000"/>
+                  </a:schemeClr>
+                </a:solidFill>
+                <a:latin typeface="Arial"/>
+              </a:defRPr>
+            </a:lvl1pPr>
+          </a:lstStyle>
+          <a:p>
+            <a:fld id="{8E6562B1-0B0F-0246-9532-09536BC2AE59}" type="slidenum">
+              <a:rPr lang="en-US" smtClean="0"/>
+              <a:pPr/>
+              <a:t>‹#›</a:t>
+            </a:fld>
+            <a:endParaRPr lang="en-US" dirty="0"/>
+          </a:p>
+        </p:txBody>
+      </p:sp>
+      <p:pic>
+        <p:nvPicPr>
+          <p:cNvPr id="7" name="Picture 6"/>
+          <p:cNvPicPr>
+            <a:picLocks noChangeAspect="1"/>
+          </p:cNvPicPr>
+          <p:nvPr userDrawn="1"/>
+        </p:nvPicPr>
+        <p:blipFill>
+          <a:blip r:embed="rId3">
+            <a:extLst>
+              <a:ext uri="{28A0092B-C50C-407E-A947-70E740481C1C}">
+                <a14:useLocalDpi xmlns:a14="http://schemas.microsoft.com/office/drawing/2010/main" val="0"/>
+              </a:ext>
+            </a:extLst>
+          </a:blip>
+          <a:stretch>
+            <a:fillRect/>
+          </a:stretch>
+        </p:blipFill>
+        <p:spPr>
+          <a:xfrm>
+            <a:off x="0" y="6496255"/>
+            <a:ext cx="12192000" cy="382524"/>
+          </a:xfrm>
+          <a:prstGeom prst="rect">
+            <a:avLst/>
+          </a:prstGeom>
+        </p:spPr>
+      </p:pic>
+    </p:spTree>
+    <p:extLst>
+      <p:ext uri="{BB962C8B-B14F-4D97-AF65-F5344CB8AC3E}">
+        <p14:creationId xmlns:p14="http://schemas.microsoft.com/office/powerpoint/2010/main" val="671930949"/>
+      </p:ext>
+    </p:extLst>
+  </p:cSld>
+  <p:clrMap bg1="lt1" tx1="dk1" bg2="lt2" tx2="dk2" accent1="accent1" accent2="accent2" accent3="accent3" accent4="accent4" accent5="accent5" accent6="accent6" hlink="hlink" folHlink="folHlink"/>
+  <p:sldLayoutIdLst>
+    <p:sldLayoutId id="2147483649" r:id="rId1"/>
+  </p:sldLayoutIdLst>
+  <p:txStyles>
+    <p:titleStyle>
+      <a:lvl1pPr algn="l" defTabSz="457200" rtl="0" eaLnBrk="1" latinLnBrk="0" hangingPunct="1">
+        <a:spcBef>
+          <a:spcPct val="0"/>
+        </a:spcBef>
+        <a:buNone/>
+        <a:defRPr sz="4400" kern="1200">
+          <a:solidFill>
+            <a:schemeClr val="tx1"/>
+          </a:solidFill>
+          <a:latin typeface="Arial"/>
+          <a:ea typeface="+mj-ea"/>
+          <a:cs typeface="+mj-cs"/>
+        </a:defRPr>
+      </a:lvl1pPr>
+    </p:titleStyle>
+    <p:bodyStyle>
+      <a:lvl1pPr marL="342900" indent="-342900" algn="l" defTabSz="457200" rtl="0" eaLnBrk="1" latinLnBrk="0" hangingPunct="1">
+        <a:spcBef>
+          <a:spcPct val="20000"/>
+        </a:spcBef>
+        <a:buFont typeface="Arial"/>
+        <a:buChar char="•"/>
+        <a:defRPr sz="3200" kern="1200">
+          <a:solidFill>
+            <a:schemeClr val="tx1"/>
+          </a:solidFill>
+          <a:latin typeface="Arial"/>
+          <a:ea typeface="+mn-ea"/>
+          <a:cs typeface="+mn-cs"/>
+        </a:defRPr>
+      </a:lvl1pPr>
+      <a:lvl2pPr marL="742950" indent="-285750" algn="l" defTabSz="457200" rtl="0" eaLnBrk="1" latinLnBrk="0" hangingPunct="1">
+        <a:spcBef>
+          <a:spcPct val="20000"/>
+        </a:spcBef>
+        <a:buFont typeface="Arial"/>
+        <a:buChar char="–"/>
+        <a:defRPr sz="2800" kern="1200">
+          <a:solidFill>
+            <a:schemeClr val="tx1"/>
+          </a:solidFill>
+          <a:latin typeface="Arial"/>
+          <a:ea typeface="+mn-ea"/>
+          <a:cs typeface="+mn-cs"/>
+        </a:defRPr>
+      </a:lvl2pPr>
+      <a:lvl3pPr marL="1143000" indent="-228600" algn="l" defTabSz="457200" rtl="0" eaLnBrk="1" latinLnBrk="0" hangingPunct="1">
+        <a:spcBef>
+          <a:spcPct val="20000"/>
+        </a:spcBef>
+        <a:buFont typeface="Arial"/>
+        <a:buChar char="•"/>
+        <a:defRPr sz="2400" kern="1200">
+          <a:solidFill>
+            <a:schemeClr val="tx1"/>
+          </a:solidFill>
+          <a:latin typeface="Arial"/>
+          <a:ea typeface="+mn-ea"/>
+          <a:cs typeface="+mn-cs"/>
+        </a:defRPr>
+      </a:lvl3pPr>
+      <a:lvl4pPr marL="1600200" indent="-228600" algn="l" defTabSz="457200" rtl="0" eaLnBrk="1" latinLnBrk="0" hangingPunct="1">
+        <a:spcBef>
+          <a:spcPct val="20000"/>
+        </a:spcBef>
+        <a:buFont typeface="Arial"/>
+        <a:buChar char="–"/>
+        <a:defRPr sz="2000" kern="1200">
+          <a:solidFill>
+            <a:schemeClr val="tx1"/>
+          </a:solidFill>
+          <a:latin typeface="Arial"/>
+          <a:ea typeface="+mn-ea"/>
+          <a:cs typeface="+mn-cs"/>
+        </a:defRPr>
+      </a:lvl4pPr>
+      <a:lvl5pPr marL="2057400" indent="-228600" algn="l" defTabSz="457200" rtl="0" eaLnBrk="1" latinLnBrk="0" hangingPunct="1">
+        <a:spcBef>
+          <a:spcPct val="20000"/>
+        </a:spcBef>
+        <a:buFont typeface="Arial"/>
+        <a:buChar char="»"/>
+        <a:defRPr sz="2000" kern="1200">
+          <a:solidFill>
+            <a:schemeClr val="tx1"/>
+          </a:solidFill>
+          <a:latin typeface="Arial"/>
+          <a:ea typeface="+mn-ea"/>
+          <a:cs typeface="+mn-cs"/>
+        </a:defRPr>
+      </a:lvl5pPr>
+      <a:lvl6pPr marL="2514600" indent="-228600" algn="l" defTabSz="457200" rtl="0" eaLnBrk="1" latinLnBrk="0" hangingPunct="1">
+        <a:spcBef>
+          <a:spcPct val="20000"/>
+        </a:spcBef>
+        <a:buFont typeface="Arial"/>
+        <a:buChar char="•"/>
+        <a:defRPr sz="2000" kern="1200">
+          <a:solidFill>
+            <a:schemeClr val="tx1"/>
+          </a:solidFill>
+          <a:latin typeface="+mn-lt"/>
+          <a:ea typeface="+mn-ea"/>
+          <a:cs typeface="+mn-cs"/>
+        </a:defRPr>
+      </a:lvl6pPr>
+      <a:lvl7pPr marL="2971800" indent="-228600" algn="l" defTabSz="457200" rtl="0" eaLnBrk="1" latinLnBrk="0" hangingPunct="1">
+        <a:spcBef>
+          <a:spcPct val="20000"/>
+        </a:spcBef>
+        <a:buFont typeface="Arial"/>
+        <a:buChar char="•"/>
+        <a:defRPr sz="2000" kern="1200">
+          <a:solidFill>
+            <a:schemeClr val="tx1"/>
+          </a:solidFill>
+          <a:latin typeface="+mn-lt"/>
+          <a:ea typeface="+mn-ea"/>
+          <a:cs typeface="+mn-cs"/>
+        </a:defRPr>
+      </a:lvl7pPr>
+      <a:lvl8pPr marL="3429000" indent="-228600" algn="l" defTabSz="457200" rtl="0" eaLnBrk="1" latinLnBrk="0" hangingPunct="1">
+        <a:spcBef>
+          <a:spcPct val="20000"/>
+        </a:spcBef>
+        <a:buFont typeface="Arial"/>
+        <a:buChar char="•"/>
+        <a:defRPr sz="2000" kern="1200">
+          <a:solidFill>
+            <a:schemeClr val="tx1"/>
+          </a:solidFill>
+          <a:latin typeface="+mn-lt"/>
+          <a:ea typeface="+mn-ea"/>
+          <a:cs typeface="+mn-cs"/>
+        </a:defRPr>
+      </a:lvl8pPr>
+      <a:lvl9pPr marL="3886200" indent="-228600" algn="l" defTabSz="457200" rtl="0" eaLnBrk="1" latinLnBrk="0" hangingPunct="1">
+        <a:spcBef>
+          <a:spcPct val="20000"/>
+        </a:spcBef>
+        <a:buFont typeface="Arial"/>
+        <a:buChar char="•"/>
+        <a:defRPr sz="2000" kern="1200">
+          <a:solidFill>
+            <a:schemeClr val="tx1"/>
+          </a:solidFill>
+          <a:latin typeface="+mn-lt"/>
+          <a:ea typeface="+mn-ea"/>
+          <a:cs typeface="+mn-cs"/>
+        </a:defRPr>
+      </a:lvl9pPr>
+    </p:bodyStyle>
+    <p:otherStyle>
+      <a:defPPr>
+        <a:defRPr lang="en-US"/>
+      </a:defPPr>
+      <a:lvl1pPr marL="0" algn="l" defTabSz="457200" rtl="0" eaLnBrk="1" latinLnBrk="0" hangingPunct="1">
+        <a:defRPr sz="1800" kern="1200">
+          <a:solidFill>
+            <a:schemeClr val="tx1"/>
+          </a:solidFill>
+          <a:latin typeface="+mn-lt"/>
+          <a:ea typeface="+mn-ea"/>
+          <a:cs typeface="+mn-cs"/>
+        </a:defRPr>
+      </a:lvl1pPr>
+      <a:lvl2pPr marL="457200" algn="l" defTabSz="457200" rtl="0" eaLnBrk="1" latinLnBrk="0" hangingPunct="1">
+        <a:defRPr sz="1800" kern="1200">
+          <a:solidFill>
+            <a:schemeClr val="tx1"/>
+          </a:solidFill>
+          <a:latin typeface="+mn-lt"/>
+          <a:ea typeface="+mn-ea"/>
+          <a:cs typeface="+mn-cs"/>
+        </a:defRPr>
+      </a:lvl2pPr>
+      <a:lvl3pPr marL="914400" algn="l" defTabSz="457200" rtl="0" eaLnBrk="1" latinLnBrk="0" hangingPunct="1">
+        <a:defRPr sz="1800" kern="1200">
+          <a:solidFill>
+            <a:schemeClr val="tx1"/>
+          </a:solidFill>
+          <a:latin typeface="+mn-lt"/>
+          <a:ea typeface="+mn-ea"/>
+          <a:cs typeface="+mn-cs"/>
+        </a:defRPr>
+      </a:lvl3pPr>
+      <a:lvl4pPr marL="1371600" algn="l" defTabSz="457200" rtl="0" eaLnBrk="1" latinLnBrk="0" hangingPunct="1">
+        <a:defRPr sz="1800" kern="1200">
+          <a:solidFill>
+            <a:schemeClr val="tx1"/>
+          </a:solidFill>
+          <a:latin typeface="+mn-lt"/>
+          <a:ea typeface="+mn-ea"/>
+          <a:cs typeface="+mn-cs"/>
+        </a:defRPr>
+      </a:lvl4pPr>
+      <a:lvl5pPr marL="1828800" algn="l" defTabSz="457200" rtl="0" eaLnBrk="1" latinLnBrk="0" hangingPunct="1">
+        <a:defRPr sz="1800" kern="1200">
+          <a:solidFill>
+            <a:schemeClr val="tx1"/>
+          </a:solidFill>
+          <a:latin typeface="+mn-lt"/>
+          <a:ea typeface="+mn-ea"/>
+          <a:cs typeface="+mn-cs"/>
+        </a:defRPr>
+      </a:lvl5pPr>
+      <a:lvl6pPr marL="2286000" algn="l" defTabSz="457200" rtl="0" eaLnBrk="1" latinLnBrk="0" hangingPunct="1">
+        <a:defRPr sz="1800" kern="1200">
+          <a:solidFill>
+            <a:schemeClr val="tx1"/>
+          </a:solidFill>
+          <a:latin typeface="+mn-lt"/>
+          <a:ea typeface="+mn-ea"/>
+          <a:cs typeface="+mn-cs"/>
+        </a:defRPr>
+      </a:lvl6pPr>
+      <a:lvl7pPr marL="2743200" algn="l" defTabSz="457200" rtl="0" eaLnBrk="1" latinLnBrk="0" hangingPunct="1">
+        <a:defRPr sz="1800" kern="1200">
+          <a:solidFill>
+            <a:schemeClr val="tx1"/>
+          </a:solidFill>
+          <a:latin typeface="+mn-lt"/>
+          <a:ea typeface="+mn-ea"/>
+          <a:cs typeface="+mn-cs"/>
+        </a:defRPr>
+      </a:lvl7pPr>
+      <a:lvl8pPr marL="3200400" algn="l" defTabSz="457200" rtl="0" eaLnBrk="1" latinLnBrk="0" hangingPunct="1">
+        <a:defRPr sz="1800" kern="1200">
+          <a:solidFill>
+            <a:schemeClr val="tx1"/>
+          </a:solidFill>
+          <a:latin typeface="+mn-lt"/>
+          <a:ea typeface="+mn-ea"/>
+          <a:cs typeface="+mn-cs"/>
+        </a:defRPr>
+      </a:lvl8pPr>
+      <a:lvl9pPr marL="3657600" algn="l" defTabSz="457200" rtl="0" eaLnBrk="1" latinLnBrk="0" hangingPunct="1">
+        <a:defRPr sz="1800" kern="1200">
+          <a:solidFill>
+            <a:schemeClr val="tx1"/>
+          </a:solidFill>
+          <a:latin typeface="+mn-lt"/>
+          <a:ea typeface="+mn-ea"/>
+          <a:cs typeface="+mn-cs"/>
+        </a:defRPr>
+      </a:lvl9pPr>
+    </p:otherStyle>
+  </p:txStyles>
+</p:sldMaster>
+</file>
+
+<file path=ppt/slides/slide1.xml><?xml version="1.0" encoding="utf-8"?>
+<p:sld xmlns:a="http://schemas.openxmlformats.org/drawingml/2006/main" xmlns:r="http://schemas.openxmlformats.org/officeDocument/2006/relationships" xmlns:p="http://schemas.openxmlformats.org/presentationml/2006/main" showMasterSp="0">
+  <p:cSld>
+    <p:bg>
+      <p:bgPr>
+        <a:blipFill dpi="0" rotWithShape="1">
+          <a:blip r:embed="rId2">
+            <a:lum/>
+          </a:blip>
+          <a:srcRect/>
+          <a:stretch>
+            <a:fillRect/>
+          </a:stretch>
+        </a:blipFill>
+        <a:effectLst/>
+      </p:bgPr>
+    </p:bg>
+    <p:spTree>
+      <p:nvGrpSpPr>
+        <p:cNvPr id="1" name=""/>
+        <p:cNvGrpSpPr/>
+        <p:nvPr/>
+      </p:nvGrpSpPr>
+      <p:grpSpPr>
+        <a:xfrm>
+          <a:off x="0" y="0"/>
+          <a:ext cx="0" cy="0"/>
+          <a:chOff x="0" y="0"/>
+          <a:chExt cx="0" cy="0"/>
+        </a:xfrm>
+      </p:grpSpPr>
+      <p:sp>
+        <p:nvSpPr>
+          <p:cNvPr id="2" name="Title 1"/>
           <p:cNvSpPr>
             <a:spLocks noGrp="1"/>
           </p:cNvSpPr>
@@ -3360,43 +4753,153 @@
             <p:ph type="ctrTitle"/>
           </p:nvPr>
         </p:nvSpPr>
-        <p:spPr/>
+        <p:spPr>
+          <a:xfrm>
+            <a:off x="511845" y="2762420"/>
+            <a:ext cx="5068559" cy="1333161"/>
+          </a:xfrm>
+        </p:spPr>
         <p:txBody>
           <a:bodyPr>
             <a:normAutofit fontScale="90000"/>
           </a:bodyPr>
-          <a:lstStyle/>
-          <a:p>
+          <a:lstStyle>
+            <a:defPPr>
+              <a:defRPr lang="en-US"/>
+            </a:defPPr>
+            <a:lvl1pPr marL="0" algn="l" defTabSz="609585" rtl="0" eaLnBrk="1" latinLnBrk="0" hangingPunct="1">
+              <a:defRPr sz="2400" kern="1200">
+                <a:solidFill>
+                  <a:schemeClr val="tx1"/>
+                </a:solidFill>
+                <a:latin typeface="+mn-lt"/>
+                <a:ea typeface="+mn-ea"/>
+                <a:cs typeface="+mn-cs"/>
+              </a:defRPr>
+            </a:lvl1pPr>
+            <a:lvl2pPr marL="609585" algn="l" defTabSz="609585" rtl="0" eaLnBrk="1" latinLnBrk="0" hangingPunct="1">
+              <a:defRPr sz="2400" kern="1200">
+                <a:solidFill>
+                  <a:schemeClr val="tx1"/>
+                </a:solidFill>
+                <a:latin typeface="+mn-lt"/>
+                <a:ea typeface="+mn-ea"/>
+                <a:cs typeface="+mn-cs"/>
+              </a:defRPr>
+            </a:lvl2pPr>
+            <a:lvl3pPr marL="1219170" algn="l" defTabSz="609585" rtl="0" eaLnBrk="1" latinLnBrk="0" hangingPunct="1">
+              <a:defRPr sz="2400" kern="1200">
+                <a:solidFill>
+                  <a:schemeClr val="tx1"/>
+                </a:solidFill>
+                <a:latin typeface="+mn-lt"/>
+                <a:ea typeface="+mn-ea"/>
+                <a:cs typeface="+mn-cs"/>
+              </a:defRPr>
+            </a:lvl3pPr>
+            <a:lvl4pPr marL="1828754" algn="l" defTabSz="609585" rtl="0" eaLnBrk="1" latinLnBrk="0" hangingPunct="1">
+              <a:defRPr sz="2400" kern="1200">
+                <a:solidFill>
+                  <a:schemeClr val="tx1"/>
+                </a:solidFill>
+                <a:latin typeface="+mn-lt"/>
+                <a:ea typeface="+mn-ea"/>
+                <a:cs typeface="+mn-cs"/>
+              </a:defRPr>
+            </a:lvl4pPr>
+            <a:lvl5pPr marL="2438339" algn="l" defTabSz="609585" rtl="0" eaLnBrk="1" latinLnBrk="0" hangingPunct="1">
+              <a:defRPr sz="2400" kern="1200">
+                <a:solidFill>
+                  <a:schemeClr val="tx1"/>
+                </a:solidFill>
+                <a:latin typeface="+mn-lt"/>
+                <a:ea typeface="+mn-ea"/>
+                <a:cs typeface="+mn-cs"/>
+              </a:defRPr>
+            </a:lvl5pPr>
+            <a:lvl6pPr marL="3047924" algn="l" defTabSz="609585" rtl="0" eaLnBrk="1" latinLnBrk="0" hangingPunct="1">
+              <a:defRPr sz="2400" kern="1200">
+                <a:solidFill>
+                  <a:schemeClr val="tx1"/>
+                </a:solidFill>
+                <a:latin typeface="+mn-lt"/>
+                <a:ea typeface="+mn-ea"/>
+                <a:cs typeface="+mn-cs"/>
+              </a:defRPr>
+            </a:lvl6pPr>
+            <a:lvl7pPr marL="3657509" algn="l" defTabSz="609585" rtl="0" eaLnBrk="1" latinLnBrk="0" hangingPunct="1">
+              <a:defRPr sz="2400" kern="1200">
+                <a:solidFill>
+                  <a:schemeClr val="tx1"/>
+                </a:solidFill>
+                <a:latin typeface="+mn-lt"/>
+                <a:ea typeface="+mn-ea"/>
+                <a:cs typeface="+mn-cs"/>
+              </a:defRPr>
+            </a:lvl7pPr>
+            <a:lvl8pPr marL="4267093" algn="l" defTabSz="609585" rtl="0" eaLnBrk="1" latinLnBrk="0" hangingPunct="1">
+              <a:defRPr sz="2400" kern="1200">
+                <a:solidFill>
+                  <a:schemeClr val="tx1"/>
+                </a:solidFill>
+                <a:latin typeface="+mn-lt"/>
+                <a:ea typeface="+mn-ea"/>
+                <a:cs typeface="+mn-cs"/>
+              </a:defRPr>
+            </a:lvl8pPr>
+            <a:lvl9pPr marL="4876678" algn="l" defTabSz="609585" rtl="0" eaLnBrk="1" latinLnBrk="0" hangingPunct="1">
+              <a:defRPr sz="2400" kern="1200">
+                <a:solidFill>
+                  <a:schemeClr val="tx1"/>
+                </a:solidFill>
+                <a:latin typeface="+mn-lt"/>
+                <a:ea typeface="+mn-ea"/>
+                <a:cs typeface="+mn-cs"/>
+              </a:defRPr>
+            </a:lvl9pPr>
+          </a:lstStyle>
+          <a:p>
+            <a:pPr algn="l"/>
+            <a:r>
+              <a:rPr lang="en-US" sz="2667" b="1" dirty="0">
+                <a:solidFill>
+                  <a:schemeClr val="bg1"/>
+                </a:solidFill>
+                <a:cs typeface="Arial"/>
+              </a:rPr>
+              <a:t>Event-driven Real-time EV Charging schedule optimization (Local, charging station-level)</a:t>
+            </a:r>
             <a:br>
-              <a:rPr lang="en-US" dirty="0"/>
-            </a:br>
-            <a:r>
-              <a:rPr lang="en-US" sz="3300" dirty="0"/>
-              <a:t>Event-driven Real-time EV Charging schedule optimization (Local, charging station-level)</a:t>
-            </a:r>
-            <a:br>
-              <a:rPr lang="en-US" sz="3300" dirty="0"/>
+              <a:rPr lang="en-US" sz="2667" b="1" dirty="0">
+                <a:solidFill>
+                  <a:schemeClr val="bg1"/>
+                </a:solidFill>
+                <a:cs typeface="Arial"/>
+              </a:rPr>
             </a:br>
             <a:br>
-              <a:rPr lang="en-US" sz="3300" dirty="0"/>
+              <a:rPr lang="en-US" sz="2667" b="1" dirty="0">
+                <a:solidFill>
+                  <a:schemeClr val="bg1"/>
+                </a:solidFill>
+                <a:cs typeface="Arial"/>
+              </a:rPr>
             </a:br>
             <a:r>
-              <a:rPr lang="en-US" sz="3300" dirty="0"/>
-              <a:t>Test case : 1 week</a:t>
-            </a:r>
-            <a:endParaRPr lang="en-SG" sz="3300" dirty="0"/>
-          </a:p>
-        </p:txBody>
-      </p:sp>
-      <p:sp>
-        <p:nvSpPr>
-          <p:cNvPr id="3" name="Subtitle 2">
-            <a:extLst>
-              <a:ext uri="{FF2B5EF4-FFF2-40B4-BE49-F238E27FC236}">
-                <a16:creationId xmlns:a16="http://schemas.microsoft.com/office/drawing/2014/main" id="{8F55090A-8400-42C1-8170-F9252F764277}"/>
-              </a:ext>
-            </a:extLst>
-          </p:cNvPr>
+              <a:rPr lang="en-US" sz="2667" b="1" dirty="0">
+                <a:solidFill>
+                  <a:schemeClr val="bg1"/>
+                </a:solidFill>
+                <a:cs typeface="Arial"/>
+              </a:rPr>
+              <a:t>Test data duration: 1 Week</a:t>
+            </a:r>
+          </a:p>
+        </p:txBody>
+      </p:sp>
+      <p:sp>
+        <p:nvSpPr>
+          <p:cNvPr id="3" name="Subtitle 2"/>
           <p:cNvSpPr>
             <a:spLocks noGrp="1"/>
           </p:cNvSpPr>
@@ -3404,49 +4907,216 @@
             <p:ph type="subTitle" idx="1"/>
           </p:nvPr>
         </p:nvSpPr>
-        <p:spPr/>
+        <p:spPr>
+          <a:xfrm>
+            <a:off x="511844" y="4591973"/>
+            <a:ext cx="6678293" cy="1687057"/>
+          </a:xfrm>
+        </p:spPr>
         <p:txBody>
           <a:bodyPr>
-            <a:normAutofit lnSpcReduction="10000"/>
+            <a:normAutofit fontScale="92500" lnSpcReduction="10000"/>
           </a:bodyPr>
-          <a:lstStyle/>
-          <a:p>
-            <a:r>
-              <a:rPr lang="en-US" dirty="0"/>
-              <a:t>					</a:t>
-            </a:r>
-          </a:p>
-          <a:p>
-            <a:r>
-              <a:rPr lang="en-US" dirty="0"/>
-              <a:t>				</a:t>
-            </a:r>
-          </a:p>
-          <a:p>
-            <a:r>
-              <a:rPr lang="en-US" dirty="0"/>
-              <a:t>							Jose Peeterson</a:t>
-            </a:r>
-          </a:p>
-          <a:p>
-            <a:r>
-              <a:rPr lang="en-US" dirty="0"/>
-              <a:t>							30/11/2021</a:t>
-            </a:r>
-            <a:endParaRPr lang="en-SG" dirty="0"/>
-          </a:p>
-        </p:txBody>
-      </p:sp>
+          <a:lstStyle>
+            <a:defPPr>
+              <a:defRPr lang="en-US"/>
+            </a:defPPr>
+            <a:lvl1pPr marL="0" algn="l" defTabSz="609585" rtl="0" eaLnBrk="1" latinLnBrk="0" hangingPunct="1">
+              <a:defRPr sz="2400" kern="1200">
+                <a:solidFill>
+                  <a:schemeClr val="tx1"/>
+                </a:solidFill>
+                <a:latin typeface="+mn-lt"/>
+                <a:ea typeface="+mn-ea"/>
+                <a:cs typeface="+mn-cs"/>
+              </a:defRPr>
+            </a:lvl1pPr>
+            <a:lvl2pPr marL="609585" algn="l" defTabSz="609585" rtl="0" eaLnBrk="1" latinLnBrk="0" hangingPunct="1">
+              <a:defRPr sz="2400" kern="1200">
+                <a:solidFill>
+                  <a:schemeClr val="tx1"/>
+                </a:solidFill>
+                <a:latin typeface="+mn-lt"/>
+                <a:ea typeface="+mn-ea"/>
+                <a:cs typeface="+mn-cs"/>
+              </a:defRPr>
+            </a:lvl2pPr>
+            <a:lvl3pPr marL="1219170" algn="l" defTabSz="609585" rtl="0" eaLnBrk="1" latinLnBrk="0" hangingPunct="1">
+              <a:defRPr sz="2400" kern="1200">
+                <a:solidFill>
+                  <a:schemeClr val="tx1"/>
+                </a:solidFill>
+                <a:latin typeface="+mn-lt"/>
+                <a:ea typeface="+mn-ea"/>
+                <a:cs typeface="+mn-cs"/>
+              </a:defRPr>
+            </a:lvl3pPr>
+            <a:lvl4pPr marL="1828754" algn="l" defTabSz="609585" rtl="0" eaLnBrk="1" latinLnBrk="0" hangingPunct="1">
+              <a:defRPr sz="2400" kern="1200">
+                <a:solidFill>
+                  <a:schemeClr val="tx1"/>
+                </a:solidFill>
+                <a:latin typeface="+mn-lt"/>
+                <a:ea typeface="+mn-ea"/>
+                <a:cs typeface="+mn-cs"/>
+              </a:defRPr>
+            </a:lvl4pPr>
+            <a:lvl5pPr marL="2438339" algn="l" defTabSz="609585" rtl="0" eaLnBrk="1" latinLnBrk="0" hangingPunct="1">
+              <a:defRPr sz="2400" kern="1200">
+                <a:solidFill>
+                  <a:schemeClr val="tx1"/>
+                </a:solidFill>
+                <a:latin typeface="+mn-lt"/>
+                <a:ea typeface="+mn-ea"/>
+                <a:cs typeface="+mn-cs"/>
+              </a:defRPr>
+            </a:lvl5pPr>
+            <a:lvl6pPr marL="3047924" algn="l" defTabSz="609585" rtl="0" eaLnBrk="1" latinLnBrk="0" hangingPunct="1">
+              <a:defRPr sz="2400" kern="1200">
+                <a:solidFill>
+                  <a:schemeClr val="tx1"/>
+                </a:solidFill>
+                <a:latin typeface="+mn-lt"/>
+                <a:ea typeface="+mn-ea"/>
+                <a:cs typeface="+mn-cs"/>
+              </a:defRPr>
+            </a:lvl6pPr>
+            <a:lvl7pPr marL="3657509" algn="l" defTabSz="609585" rtl="0" eaLnBrk="1" latinLnBrk="0" hangingPunct="1">
+              <a:defRPr sz="2400" kern="1200">
+                <a:solidFill>
+                  <a:schemeClr val="tx1"/>
+                </a:solidFill>
+                <a:latin typeface="+mn-lt"/>
+                <a:ea typeface="+mn-ea"/>
+                <a:cs typeface="+mn-cs"/>
+              </a:defRPr>
+            </a:lvl7pPr>
+            <a:lvl8pPr marL="4267093" algn="l" defTabSz="609585" rtl="0" eaLnBrk="1" latinLnBrk="0" hangingPunct="1">
+              <a:defRPr sz="2400" kern="1200">
+                <a:solidFill>
+                  <a:schemeClr val="tx1"/>
+                </a:solidFill>
+                <a:latin typeface="+mn-lt"/>
+                <a:ea typeface="+mn-ea"/>
+                <a:cs typeface="+mn-cs"/>
+              </a:defRPr>
+            </a:lvl8pPr>
+            <a:lvl9pPr marL="4876678" algn="l" defTabSz="609585" rtl="0" eaLnBrk="1" latinLnBrk="0" hangingPunct="1">
+              <a:defRPr sz="2400" kern="1200">
+                <a:solidFill>
+                  <a:schemeClr val="tx1"/>
+                </a:solidFill>
+                <a:latin typeface="+mn-lt"/>
+                <a:ea typeface="+mn-ea"/>
+                <a:cs typeface="+mn-cs"/>
+              </a:defRPr>
+            </a:lvl9pPr>
+          </a:lstStyle>
+          <a:p>
+            <a:pPr algn="l"/>
+            <a:r>
+              <a:rPr lang="en-US" sz="2000" dirty="0">
+                <a:solidFill>
+                  <a:srgbClr val="FFFFFF"/>
+                </a:solidFill>
+                <a:cs typeface="Arial"/>
+              </a:rPr>
+              <a:t>Date: 30/11/2021</a:t>
+            </a:r>
+          </a:p>
+          <a:p>
+            <a:pPr algn="l"/>
+            <a:endParaRPr lang="en-US" sz="2000" dirty="0">
+              <a:solidFill>
+                <a:srgbClr val="FFFFFF"/>
+              </a:solidFill>
+              <a:cs typeface="Arial"/>
+            </a:endParaRPr>
+          </a:p>
+          <a:p>
+            <a:pPr algn="l"/>
+            <a:endParaRPr lang="en-US" sz="2000" dirty="0">
+              <a:solidFill>
+                <a:srgbClr val="FFFFFF"/>
+              </a:solidFill>
+              <a:cs typeface="Arial"/>
+            </a:endParaRPr>
+          </a:p>
+          <a:p>
+            <a:pPr algn="l"/>
+            <a:endParaRPr lang="en-US" sz="2000" dirty="0">
+              <a:solidFill>
+                <a:srgbClr val="FFFFFF"/>
+              </a:solidFill>
+              <a:cs typeface="Arial"/>
+            </a:endParaRPr>
+          </a:p>
+          <a:p>
+            <a:pPr algn="l"/>
+            <a:r>
+              <a:rPr lang="en-US" sz="2000" dirty="0">
+                <a:solidFill>
+                  <a:srgbClr val="FFFFFF"/>
+                </a:solidFill>
+                <a:cs typeface="Arial"/>
+              </a:rPr>
+              <a:t>Jose Peeterson</a:t>
+            </a:r>
+          </a:p>
+        </p:txBody>
+      </p:sp>
+      <p:pic>
+        <p:nvPicPr>
+          <p:cNvPr id="11" name="Picture 10">
+            <a:extLst>
+              <a:ext uri="{FF2B5EF4-FFF2-40B4-BE49-F238E27FC236}">
+                <a16:creationId xmlns:a16="http://schemas.microsoft.com/office/drawing/2014/main" id="{0B68ACF4-C4E0-2B4D-9C42-40EBB4A25824}"/>
+              </a:ext>
+            </a:extLst>
+          </p:cNvPr>
+          <p:cNvPicPr>
+            <a:picLocks noChangeAspect="1"/>
+          </p:cNvPicPr>
+          <p:nvPr/>
+        </p:nvPicPr>
+        <p:blipFill>
+          <a:blip r:embed="rId3"/>
+          <a:stretch>
+            <a:fillRect/>
+          </a:stretch>
+        </p:blipFill>
+        <p:spPr>
+          <a:xfrm>
+            <a:off x="501457" y="348787"/>
+            <a:ext cx="5226680" cy="1469464"/>
+          </a:xfrm>
+          <a:prstGeom prst="rect">
+            <a:avLst/>
+          </a:prstGeom>
+        </p:spPr>
+      </p:pic>
     </p:spTree>
     <p:extLst>
       <p:ext uri="{BB962C8B-B14F-4D97-AF65-F5344CB8AC3E}">
-        <p14:creationId xmlns:p14="http://schemas.microsoft.com/office/powerpoint/2010/main" val="1405742737"/>
+        <p14:creationId xmlns:p14="http://schemas.microsoft.com/office/powerpoint/2010/main" val="807217707"/>
       </p:ext>
     </p:extLst>
   </p:cSld>
   <p:clrMapOvr>
     <a:masterClrMapping/>
   </p:clrMapOvr>
+  <mc:AlternateContent xmlns:mc="http://schemas.openxmlformats.org/markup-compatibility/2006">
+    <mc:Choice xmlns:p14="http://schemas.microsoft.com/office/powerpoint/2010/main" Requires="p14">
+      <p:transition spd="med" p14:dur="700">
+        <p:fade/>
+      </p:transition>
+    </mc:Choice>
+    <mc:Fallback>
+      <p:transition spd="med">
+        <p:fade/>
+      </p:transition>
+    </mc:Fallback>
+  </mc:AlternateContent>
 </p:sld>
 </file>
 
@@ -3472,7 +5142,7 @@
           <p:cNvPr id="2" name="Title 1">
             <a:extLst>
               <a:ext uri="{FF2B5EF4-FFF2-40B4-BE49-F238E27FC236}">
-                <a16:creationId xmlns:a16="http://schemas.microsoft.com/office/drawing/2014/main" id="{B64EA3CE-F0E6-49A5-BD83-2BD835935C07}"/>
+                <a16:creationId xmlns:a16="http://schemas.microsoft.com/office/drawing/2014/main" id="{57782F54-D006-44D8-968D-72BBFA6F5CDB}"/>
               </a:ext>
             </a:extLst>
           </p:cNvPr>
@@ -3481,6 +5151,186 @@
           </p:cNvSpPr>
           <p:nvPr>
             <p:ph type="title"/>
+          </p:nvPr>
+        </p:nvSpPr>
+        <p:spPr>
+          <a:xfrm>
+            <a:off x="0" y="3703"/>
+            <a:ext cx="10972800" cy="1143000"/>
+          </a:xfrm>
+        </p:spPr>
+        <p:txBody>
+          <a:bodyPr>
+            <a:normAutofit/>
+          </a:bodyPr>
+          <a:lstStyle/>
+          <a:p>
+            <a:pPr algn="ctr"/>
+            <a:r>
+              <a:rPr lang="en-US" sz="3200" dirty="0"/>
+              <a:t>Objective function: Rental availability</a:t>
+            </a:r>
+            <a:endParaRPr lang="en-SG" sz="3200" b="1" dirty="0">
+              <a:solidFill>
+                <a:schemeClr val="tx2">
+                  <a:lumMod val="60000"/>
+                  <a:lumOff val="40000"/>
+                </a:schemeClr>
+              </a:solidFill>
+            </a:endParaRPr>
+          </a:p>
+        </p:txBody>
+      </p:sp>
+      <p:grpSp>
+        <p:nvGrpSpPr>
+          <p:cNvPr id="4" name="Gruppieren 45">
+            <a:extLst>
+              <a:ext uri="{FF2B5EF4-FFF2-40B4-BE49-F238E27FC236}">
+                <a16:creationId xmlns:a16="http://schemas.microsoft.com/office/drawing/2014/main" id="{C06F94F2-D8CC-455C-9558-8A679DFEEF12}"/>
+              </a:ext>
+            </a:extLst>
+          </p:cNvPr>
+          <p:cNvGrpSpPr/>
+          <p:nvPr/>
+        </p:nvGrpSpPr>
+        <p:grpSpPr>
+          <a:xfrm>
+            <a:off x="526723" y="3255540"/>
+            <a:ext cx="11138228" cy="3008424"/>
+            <a:chOff x="395288" y="1488184"/>
+            <a:chExt cx="8353671" cy="2256318"/>
+          </a:xfrm>
+        </p:grpSpPr>
+        <p:cxnSp>
+          <p:nvCxnSpPr>
+            <p:cNvPr id="6" name="Gerader Verbinder 47">
+              <a:extLst>
+                <a:ext uri="{FF2B5EF4-FFF2-40B4-BE49-F238E27FC236}">
+                  <a16:creationId xmlns:a16="http://schemas.microsoft.com/office/drawing/2014/main" id="{E14AA87F-05EE-4B33-98DC-F08DC9C65D2A}"/>
+                </a:ext>
+              </a:extLst>
+            </p:cNvPr>
+            <p:cNvCxnSpPr/>
+            <p:nvPr/>
+          </p:nvCxnSpPr>
+          <p:spPr>
+            <a:xfrm>
+              <a:off x="395536" y="3744502"/>
+              <a:ext cx="8353177" cy="0"/>
+            </a:xfrm>
+            <a:prstGeom prst="line">
+              <a:avLst/>
+            </a:prstGeom>
+            <a:ln w="28575">
+              <a:solidFill>
+                <a:schemeClr val="accent1"/>
+              </a:solidFill>
+            </a:ln>
+          </p:spPr>
+          <p:style>
+            <a:lnRef idx="1">
+              <a:schemeClr val="accent1"/>
+            </a:lnRef>
+            <a:fillRef idx="0">
+              <a:schemeClr val="accent1"/>
+            </a:fillRef>
+            <a:effectRef idx="0">
+              <a:schemeClr val="accent1"/>
+            </a:effectRef>
+            <a:fontRef idx="minor">
+              <a:schemeClr val="tx1"/>
+            </a:fontRef>
+          </p:style>
+        </p:cxnSp>
+        <p:sp>
+          <p:nvSpPr>
+            <p:cNvPr id="5" name="Rechteck 46">
+              <a:extLst>
+                <a:ext uri="{FF2B5EF4-FFF2-40B4-BE49-F238E27FC236}">
+                  <a16:creationId xmlns:a16="http://schemas.microsoft.com/office/drawing/2014/main" id="{C7DF0488-B941-422F-869F-09243FFD17DB}"/>
+                </a:ext>
+              </a:extLst>
+            </p:cNvPr>
+            <p:cNvSpPr/>
+            <p:nvPr/>
+          </p:nvSpPr>
+          <p:spPr>
+            <a:xfrm>
+              <a:off x="395288" y="1488184"/>
+              <a:ext cx="8353671" cy="2256318"/>
+            </a:xfrm>
+            <a:prstGeom prst="rect">
+              <a:avLst/>
+            </a:prstGeom>
+            <a:gradFill flip="none" rotWithShape="1">
+              <a:gsLst>
+                <a:gs pos="0">
+                  <a:schemeClr val="bg2">
+                    <a:lumMod val="90000"/>
+                    <a:alpha val="60000"/>
+                  </a:schemeClr>
+                </a:gs>
+                <a:gs pos="50000">
+                  <a:schemeClr val="bg1">
+                    <a:lumMod val="95000"/>
+                    <a:alpha val="50000"/>
+                  </a:schemeClr>
+                </a:gs>
+                <a:gs pos="100000">
+                  <a:schemeClr val="bg1"/>
+                </a:gs>
+              </a:gsLst>
+              <a:lin ang="16200000" scaled="1"/>
+              <a:tileRect/>
+            </a:gradFill>
+            <a:ln w="9525">
+              <a:noFill/>
+            </a:ln>
+          </p:spPr>
+          <p:style>
+            <a:lnRef idx="1">
+              <a:schemeClr val="accent1"/>
+            </a:lnRef>
+            <a:fillRef idx="0">
+              <a:schemeClr val="accent1"/>
+            </a:fillRef>
+            <a:effectRef idx="0">
+              <a:schemeClr val="accent1"/>
+            </a:effectRef>
+            <a:fontRef idx="minor">
+              <a:schemeClr val="tx1"/>
+            </a:fontRef>
+          </p:style>
+          <p:txBody>
+            <a:bodyPr rtlCol="0" anchor="ctr"/>
+            <a:lstStyle/>
+            <a:p>
+              <a:pPr algn="ctr"/>
+              <a:endParaRPr lang="en-US" sz="2133">
+                <a:solidFill>
+                  <a:schemeClr val="bg2">
+                    <a:lumMod val="10000"/>
+                  </a:schemeClr>
+                </a:solidFill>
+              </a:endParaRPr>
+            </a:p>
+          </p:txBody>
+        </p:sp>
+      </p:grpSp>
+      <p:sp>
+        <p:nvSpPr>
+          <p:cNvPr id="8" name="Content Placeholder 7">
+            <a:extLst>
+              <a:ext uri="{FF2B5EF4-FFF2-40B4-BE49-F238E27FC236}">
+                <a16:creationId xmlns:a16="http://schemas.microsoft.com/office/drawing/2014/main" id="{CB3E9B7E-E2F7-4055-BBC2-46DEDE86A58B}"/>
+              </a:ext>
+            </a:extLst>
+          </p:cNvPr>
+          <p:cNvSpPr>
+            <a:spLocks noGrp="1"/>
+          </p:cNvSpPr>
+          <p:nvPr>
+            <p:ph idx="1"/>
           </p:nvPr>
         </p:nvSpPr>
         <p:spPr/>
@@ -3488,45 +5338,52 @@
           <a:bodyPr/>
           <a:lstStyle/>
           <a:p>
-            <a:endParaRPr lang="en-SG"/>
-          </a:p>
-        </p:txBody>
-      </p:sp>
-      <p:sp>
-        <p:nvSpPr>
-          <p:cNvPr id="3" name="Content Placeholder 2">
-            <a:extLst>
-              <a:ext uri="{FF2B5EF4-FFF2-40B4-BE49-F238E27FC236}">
-                <a16:creationId xmlns:a16="http://schemas.microsoft.com/office/drawing/2014/main" id="{13570681-3BB0-45A5-BC67-71DBFDFA0B95}"/>
-              </a:ext>
-            </a:extLst>
-          </p:cNvPr>
-          <p:cNvSpPr>
-            <a:spLocks noGrp="1"/>
-          </p:cNvSpPr>
-          <p:nvPr>
-            <p:ph idx="1"/>
-          </p:nvPr>
-        </p:nvSpPr>
-        <p:spPr/>
-        <p:txBody>
-          <a:bodyPr/>
-          <a:lstStyle/>
-          <a:p>
-            <a:endParaRPr lang="en-SG"/>
+            <a:r>
+              <a:rPr lang="en-US" dirty="0"/>
+              <a:t>Test conditions:</a:t>
+            </a:r>
+          </a:p>
+          <a:p>
+            <a:pPr lvl="1"/>
+            <a:r>
+              <a:rPr lang="en-US" dirty="0"/>
+              <a:t>1 Week data: 1 May – 7 May 2020</a:t>
+            </a:r>
+          </a:p>
+          <a:p>
+            <a:pPr lvl="1"/>
+            <a:r>
+              <a:rPr lang="en-US" dirty="0"/>
+              <a:t>Charging stations: </a:t>
+            </a:r>
+          </a:p>
+          <a:p>
+            <a:endParaRPr lang="en-SG" dirty="0"/>
           </a:p>
         </p:txBody>
       </p:sp>
     </p:spTree>
     <p:extLst>
       <p:ext uri="{BB962C8B-B14F-4D97-AF65-F5344CB8AC3E}">
-        <p14:creationId xmlns:p14="http://schemas.microsoft.com/office/powerpoint/2010/main" val="3427960162"/>
+        <p14:creationId xmlns:p14="http://schemas.microsoft.com/office/powerpoint/2010/main" val="4035199990"/>
       </p:ext>
     </p:extLst>
   </p:cSld>
   <p:clrMapOvr>
     <a:masterClrMapping/>
   </p:clrMapOvr>
+  <mc:AlternateContent xmlns:mc="http://schemas.openxmlformats.org/markup-compatibility/2006" xmlns:p14="http://schemas.microsoft.com/office/powerpoint/2010/main">
+    <mc:Choice Requires="p14">
+      <p:transition spd="med" p14:dur="700">
+        <p:fade/>
+      </p:transition>
+    </mc:Choice>
+    <mc:Fallback xmlns="">
+      <p:transition spd="med">
+        <p:fade/>
+      </p:transition>
+    </mc:Fallback>
+  </mc:AlternateContent>
 </p:sld>
 </file>
 
@@ -3552,7 +5409,7 @@
           <p:cNvPr id="2" name="Title 1">
             <a:extLst>
               <a:ext uri="{FF2B5EF4-FFF2-40B4-BE49-F238E27FC236}">
-                <a16:creationId xmlns:a16="http://schemas.microsoft.com/office/drawing/2014/main" id="{706EFBB3-C004-4829-AC7F-830C37A39020}"/>
+                <a16:creationId xmlns:a16="http://schemas.microsoft.com/office/drawing/2014/main" id="{57782F54-D006-44D8-968D-72BBFA6F5CDB}"/>
               </a:ext>
             </a:extLst>
           </p:cNvPr>
@@ -3561,6 +5418,186 @@
           </p:cNvSpPr>
           <p:nvPr>
             <p:ph type="title"/>
+          </p:nvPr>
+        </p:nvSpPr>
+        <p:spPr>
+          <a:xfrm>
+            <a:off x="0" y="3703"/>
+            <a:ext cx="10972800" cy="1143000"/>
+          </a:xfrm>
+        </p:spPr>
+        <p:txBody>
+          <a:bodyPr>
+            <a:normAutofit/>
+          </a:bodyPr>
+          <a:lstStyle/>
+          <a:p>
+            <a:pPr algn="ctr"/>
+            <a:r>
+              <a:rPr lang="en-US" sz="3200" dirty="0"/>
+              <a:t>Objective function: Rental availability</a:t>
+            </a:r>
+            <a:endParaRPr lang="en-SG" sz="3200" b="1" dirty="0">
+              <a:solidFill>
+                <a:schemeClr val="tx2">
+                  <a:lumMod val="60000"/>
+                  <a:lumOff val="40000"/>
+                </a:schemeClr>
+              </a:solidFill>
+            </a:endParaRPr>
+          </a:p>
+        </p:txBody>
+      </p:sp>
+      <p:grpSp>
+        <p:nvGrpSpPr>
+          <p:cNvPr id="4" name="Gruppieren 45">
+            <a:extLst>
+              <a:ext uri="{FF2B5EF4-FFF2-40B4-BE49-F238E27FC236}">
+                <a16:creationId xmlns:a16="http://schemas.microsoft.com/office/drawing/2014/main" id="{C06F94F2-D8CC-455C-9558-8A679DFEEF12}"/>
+              </a:ext>
+            </a:extLst>
+          </p:cNvPr>
+          <p:cNvGrpSpPr/>
+          <p:nvPr/>
+        </p:nvGrpSpPr>
+        <p:grpSpPr>
+          <a:xfrm>
+            <a:off x="526723" y="3255540"/>
+            <a:ext cx="11138228" cy="3008424"/>
+            <a:chOff x="395288" y="1488184"/>
+            <a:chExt cx="8353671" cy="2256318"/>
+          </a:xfrm>
+        </p:grpSpPr>
+        <p:cxnSp>
+          <p:nvCxnSpPr>
+            <p:cNvPr id="6" name="Gerader Verbinder 47">
+              <a:extLst>
+                <a:ext uri="{FF2B5EF4-FFF2-40B4-BE49-F238E27FC236}">
+                  <a16:creationId xmlns:a16="http://schemas.microsoft.com/office/drawing/2014/main" id="{E14AA87F-05EE-4B33-98DC-F08DC9C65D2A}"/>
+                </a:ext>
+              </a:extLst>
+            </p:cNvPr>
+            <p:cNvCxnSpPr/>
+            <p:nvPr/>
+          </p:nvCxnSpPr>
+          <p:spPr>
+            <a:xfrm>
+              <a:off x="395536" y="3744502"/>
+              <a:ext cx="8353177" cy="0"/>
+            </a:xfrm>
+            <a:prstGeom prst="line">
+              <a:avLst/>
+            </a:prstGeom>
+            <a:ln w="28575">
+              <a:solidFill>
+                <a:schemeClr val="accent1"/>
+              </a:solidFill>
+            </a:ln>
+          </p:spPr>
+          <p:style>
+            <a:lnRef idx="1">
+              <a:schemeClr val="accent1"/>
+            </a:lnRef>
+            <a:fillRef idx="0">
+              <a:schemeClr val="accent1"/>
+            </a:fillRef>
+            <a:effectRef idx="0">
+              <a:schemeClr val="accent1"/>
+            </a:effectRef>
+            <a:fontRef idx="minor">
+              <a:schemeClr val="tx1"/>
+            </a:fontRef>
+          </p:style>
+        </p:cxnSp>
+        <p:sp>
+          <p:nvSpPr>
+            <p:cNvPr id="5" name="Rechteck 46">
+              <a:extLst>
+                <a:ext uri="{FF2B5EF4-FFF2-40B4-BE49-F238E27FC236}">
+                  <a16:creationId xmlns:a16="http://schemas.microsoft.com/office/drawing/2014/main" id="{C7DF0488-B941-422F-869F-09243FFD17DB}"/>
+                </a:ext>
+              </a:extLst>
+            </p:cNvPr>
+            <p:cNvSpPr/>
+            <p:nvPr/>
+          </p:nvSpPr>
+          <p:spPr>
+            <a:xfrm>
+              <a:off x="395288" y="1488184"/>
+              <a:ext cx="8353671" cy="2256318"/>
+            </a:xfrm>
+            <a:prstGeom prst="rect">
+              <a:avLst/>
+            </a:prstGeom>
+            <a:gradFill flip="none" rotWithShape="1">
+              <a:gsLst>
+                <a:gs pos="0">
+                  <a:schemeClr val="bg2">
+                    <a:lumMod val="90000"/>
+                    <a:alpha val="60000"/>
+                  </a:schemeClr>
+                </a:gs>
+                <a:gs pos="50000">
+                  <a:schemeClr val="bg1">
+                    <a:lumMod val="95000"/>
+                    <a:alpha val="50000"/>
+                  </a:schemeClr>
+                </a:gs>
+                <a:gs pos="100000">
+                  <a:schemeClr val="bg1"/>
+                </a:gs>
+              </a:gsLst>
+              <a:lin ang="16200000" scaled="1"/>
+              <a:tileRect/>
+            </a:gradFill>
+            <a:ln w="9525">
+              <a:noFill/>
+            </a:ln>
+          </p:spPr>
+          <p:style>
+            <a:lnRef idx="1">
+              <a:schemeClr val="accent1"/>
+            </a:lnRef>
+            <a:fillRef idx="0">
+              <a:schemeClr val="accent1"/>
+            </a:fillRef>
+            <a:effectRef idx="0">
+              <a:schemeClr val="accent1"/>
+            </a:effectRef>
+            <a:fontRef idx="minor">
+              <a:schemeClr val="tx1"/>
+            </a:fontRef>
+          </p:style>
+          <p:txBody>
+            <a:bodyPr rtlCol="0" anchor="ctr"/>
+            <a:lstStyle/>
+            <a:p>
+              <a:pPr algn="ctr"/>
+              <a:endParaRPr lang="en-US" sz="2133">
+                <a:solidFill>
+                  <a:schemeClr val="bg2">
+                    <a:lumMod val="10000"/>
+                  </a:schemeClr>
+                </a:solidFill>
+              </a:endParaRPr>
+            </a:p>
+          </p:txBody>
+        </p:sp>
+      </p:grpSp>
+      <p:sp>
+        <p:nvSpPr>
+          <p:cNvPr id="8" name="Content Placeholder 7">
+            <a:extLst>
+              <a:ext uri="{FF2B5EF4-FFF2-40B4-BE49-F238E27FC236}">
+                <a16:creationId xmlns:a16="http://schemas.microsoft.com/office/drawing/2014/main" id="{CB3E9B7E-E2F7-4055-BBC2-46DEDE86A58B}"/>
+              </a:ext>
+            </a:extLst>
+          </p:cNvPr>
+          <p:cNvSpPr>
+            <a:spLocks noGrp="1"/>
+          </p:cNvSpPr>
+          <p:nvPr>
+            <p:ph idx="1"/>
           </p:nvPr>
         </p:nvSpPr>
         <p:spPr/>
@@ -3568,45 +5605,316 @@
           <a:bodyPr/>
           <a:lstStyle/>
           <a:p>
-            <a:endParaRPr lang="en-SG"/>
-          </a:p>
-        </p:txBody>
-      </p:sp>
-      <p:sp>
-        <p:nvSpPr>
-          <p:cNvPr id="3" name="Content Placeholder 2">
-            <a:extLst>
-              <a:ext uri="{FF2B5EF4-FFF2-40B4-BE49-F238E27FC236}">
-                <a16:creationId xmlns:a16="http://schemas.microsoft.com/office/drawing/2014/main" id="{93EA1492-85BC-4634-9A62-CE0E8450EB0A}"/>
-              </a:ext>
-            </a:extLst>
-          </p:cNvPr>
-          <p:cNvSpPr>
-            <a:spLocks noGrp="1"/>
-          </p:cNvSpPr>
-          <p:nvPr>
-            <p:ph idx="1"/>
-          </p:nvPr>
-        </p:nvSpPr>
-        <p:spPr/>
-        <p:txBody>
-          <a:bodyPr/>
-          <a:lstStyle/>
-          <a:p>
-            <a:endParaRPr lang="en-SG"/>
+            <a:r>
+              <a:rPr lang="en-US" dirty="0"/>
+              <a:t>Test Results:</a:t>
+            </a:r>
+          </a:p>
+          <a:p>
+            <a:pPr lvl="1"/>
+            <a:r>
+              <a:rPr lang="en-US" dirty="0"/>
+              <a:t>Computation time:</a:t>
+            </a:r>
+          </a:p>
+          <a:p>
+            <a:pPr lvl="1"/>
+            <a:endParaRPr lang="en-US" dirty="0"/>
+          </a:p>
+          <a:p>
+            <a:endParaRPr lang="en-SG" dirty="0"/>
           </a:p>
         </p:txBody>
       </p:sp>
     </p:spTree>
     <p:extLst>
       <p:ext uri="{BB962C8B-B14F-4D97-AF65-F5344CB8AC3E}">
-        <p14:creationId xmlns:p14="http://schemas.microsoft.com/office/powerpoint/2010/main" val="776708966"/>
+        <p14:creationId xmlns:p14="http://schemas.microsoft.com/office/powerpoint/2010/main" val="1431069940"/>
       </p:ext>
     </p:extLst>
   </p:cSld>
   <p:clrMapOvr>
     <a:masterClrMapping/>
   </p:clrMapOvr>
+  <mc:AlternateContent xmlns:mc="http://schemas.openxmlformats.org/markup-compatibility/2006" xmlns:p14="http://schemas.microsoft.com/office/powerpoint/2010/main">
+    <mc:Choice Requires="p14">
+      <p:transition spd="med" p14:dur="700">
+        <p:fade/>
+      </p:transition>
+    </mc:Choice>
+    <mc:Fallback xmlns="">
+      <p:transition spd="med">
+        <p:fade/>
+      </p:transition>
+    </mc:Fallback>
+  </mc:AlternateContent>
+</p:sld>
+</file>
+
+<file path=ppt/slides/slide4.xml><?xml version="1.0" encoding="utf-8"?>
+<p:sld xmlns:a="http://schemas.openxmlformats.org/drawingml/2006/main" xmlns:r="http://schemas.openxmlformats.org/officeDocument/2006/relationships" xmlns:p="http://schemas.openxmlformats.org/presentationml/2006/main">
+  <p:cSld>
+    <p:spTree>
+      <p:nvGrpSpPr>
+        <p:cNvPr id="1" name=""/>
+        <p:cNvGrpSpPr/>
+        <p:nvPr/>
+      </p:nvGrpSpPr>
+      <p:grpSpPr>
+        <a:xfrm>
+          <a:off x="0" y="0"/>
+          <a:ext cx="0" cy="0"/>
+          <a:chOff x="0" y="0"/>
+          <a:chExt cx="0" cy="0"/>
+        </a:xfrm>
+      </p:grpSpPr>
+      <p:sp>
+        <p:nvSpPr>
+          <p:cNvPr id="2" name="Title 1">
+            <a:extLst>
+              <a:ext uri="{FF2B5EF4-FFF2-40B4-BE49-F238E27FC236}">
+                <a16:creationId xmlns:a16="http://schemas.microsoft.com/office/drawing/2014/main" id="{57782F54-D006-44D8-968D-72BBFA6F5CDB}"/>
+              </a:ext>
+            </a:extLst>
+          </p:cNvPr>
+          <p:cNvSpPr>
+            <a:spLocks noGrp="1"/>
+          </p:cNvSpPr>
+          <p:nvPr>
+            <p:ph type="title"/>
+          </p:nvPr>
+        </p:nvSpPr>
+        <p:spPr>
+          <a:xfrm>
+            <a:off x="0" y="3703"/>
+            <a:ext cx="10972800" cy="1143000"/>
+          </a:xfrm>
+        </p:spPr>
+        <p:txBody>
+          <a:bodyPr>
+            <a:normAutofit/>
+          </a:bodyPr>
+          <a:lstStyle/>
+          <a:p>
+            <a:pPr algn="ctr"/>
+            <a:r>
+              <a:rPr lang="en-US" sz="3200" dirty="0"/>
+              <a:t>Objective function: MOO</a:t>
+            </a:r>
+            <a:endParaRPr lang="en-SG" sz="3200" b="1" dirty="0">
+              <a:solidFill>
+                <a:schemeClr val="tx2">
+                  <a:lumMod val="60000"/>
+                  <a:lumOff val="40000"/>
+                </a:schemeClr>
+              </a:solidFill>
+            </a:endParaRPr>
+          </a:p>
+        </p:txBody>
+      </p:sp>
+      <p:grpSp>
+        <p:nvGrpSpPr>
+          <p:cNvPr id="4" name="Gruppieren 45">
+            <a:extLst>
+              <a:ext uri="{FF2B5EF4-FFF2-40B4-BE49-F238E27FC236}">
+                <a16:creationId xmlns:a16="http://schemas.microsoft.com/office/drawing/2014/main" id="{C06F94F2-D8CC-455C-9558-8A679DFEEF12}"/>
+              </a:ext>
+            </a:extLst>
+          </p:cNvPr>
+          <p:cNvGrpSpPr/>
+          <p:nvPr/>
+        </p:nvGrpSpPr>
+        <p:grpSpPr>
+          <a:xfrm>
+            <a:off x="526723" y="3255540"/>
+            <a:ext cx="11138228" cy="3008424"/>
+            <a:chOff x="395288" y="1488184"/>
+            <a:chExt cx="8353671" cy="2256318"/>
+          </a:xfrm>
+        </p:grpSpPr>
+        <p:cxnSp>
+          <p:nvCxnSpPr>
+            <p:cNvPr id="6" name="Gerader Verbinder 47">
+              <a:extLst>
+                <a:ext uri="{FF2B5EF4-FFF2-40B4-BE49-F238E27FC236}">
+                  <a16:creationId xmlns:a16="http://schemas.microsoft.com/office/drawing/2014/main" id="{E14AA87F-05EE-4B33-98DC-F08DC9C65D2A}"/>
+                </a:ext>
+              </a:extLst>
+            </p:cNvPr>
+            <p:cNvCxnSpPr/>
+            <p:nvPr/>
+          </p:nvCxnSpPr>
+          <p:spPr>
+            <a:xfrm>
+              <a:off x="395536" y="3744502"/>
+              <a:ext cx="8353177" cy="0"/>
+            </a:xfrm>
+            <a:prstGeom prst="line">
+              <a:avLst/>
+            </a:prstGeom>
+            <a:ln w="28575">
+              <a:solidFill>
+                <a:schemeClr val="accent1"/>
+              </a:solidFill>
+            </a:ln>
+          </p:spPr>
+          <p:style>
+            <a:lnRef idx="1">
+              <a:schemeClr val="accent1"/>
+            </a:lnRef>
+            <a:fillRef idx="0">
+              <a:schemeClr val="accent1"/>
+            </a:fillRef>
+            <a:effectRef idx="0">
+              <a:schemeClr val="accent1"/>
+            </a:effectRef>
+            <a:fontRef idx="minor">
+              <a:schemeClr val="tx1"/>
+            </a:fontRef>
+          </p:style>
+        </p:cxnSp>
+        <p:sp>
+          <p:nvSpPr>
+            <p:cNvPr id="5" name="Rechteck 46">
+              <a:extLst>
+                <a:ext uri="{FF2B5EF4-FFF2-40B4-BE49-F238E27FC236}">
+                  <a16:creationId xmlns:a16="http://schemas.microsoft.com/office/drawing/2014/main" id="{C7DF0488-B941-422F-869F-09243FFD17DB}"/>
+                </a:ext>
+              </a:extLst>
+            </p:cNvPr>
+            <p:cNvSpPr/>
+            <p:nvPr/>
+          </p:nvSpPr>
+          <p:spPr>
+            <a:xfrm>
+              <a:off x="395288" y="1488184"/>
+              <a:ext cx="8353671" cy="2256318"/>
+            </a:xfrm>
+            <a:prstGeom prst="rect">
+              <a:avLst/>
+            </a:prstGeom>
+            <a:gradFill flip="none" rotWithShape="1">
+              <a:gsLst>
+                <a:gs pos="0">
+                  <a:schemeClr val="bg2">
+                    <a:lumMod val="90000"/>
+                    <a:alpha val="60000"/>
+                  </a:schemeClr>
+                </a:gs>
+                <a:gs pos="50000">
+                  <a:schemeClr val="bg1">
+                    <a:lumMod val="95000"/>
+                    <a:alpha val="50000"/>
+                  </a:schemeClr>
+                </a:gs>
+                <a:gs pos="100000">
+                  <a:schemeClr val="bg1"/>
+                </a:gs>
+              </a:gsLst>
+              <a:lin ang="16200000" scaled="1"/>
+              <a:tileRect/>
+            </a:gradFill>
+            <a:ln w="9525">
+              <a:noFill/>
+            </a:ln>
+          </p:spPr>
+          <p:style>
+            <a:lnRef idx="1">
+              <a:schemeClr val="accent1"/>
+            </a:lnRef>
+            <a:fillRef idx="0">
+              <a:schemeClr val="accent1"/>
+            </a:fillRef>
+            <a:effectRef idx="0">
+              <a:schemeClr val="accent1"/>
+            </a:effectRef>
+            <a:fontRef idx="minor">
+              <a:schemeClr val="tx1"/>
+            </a:fontRef>
+          </p:style>
+          <p:txBody>
+            <a:bodyPr rtlCol="0" anchor="ctr"/>
+            <a:lstStyle/>
+            <a:p>
+              <a:pPr algn="ctr"/>
+              <a:endParaRPr lang="en-US" sz="2133">
+                <a:solidFill>
+                  <a:schemeClr val="bg2">
+                    <a:lumMod val="10000"/>
+                  </a:schemeClr>
+                </a:solidFill>
+              </a:endParaRPr>
+            </a:p>
+          </p:txBody>
+        </p:sp>
+      </p:grpSp>
+      <p:sp>
+        <p:nvSpPr>
+          <p:cNvPr id="8" name="Content Placeholder 7">
+            <a:extLst>
+              <a:ext uri="{FF2B5EF4-FFF2-40B4-BE49-F238E27FC236}">
+                <a16:creationId xmlns:a16="http://schemas.microsoft.com/office/drawing/2014/main" id="{CB3E9B7E-E2F7-4055-BBC2-46DEDE86A58B}"/>
+              </a:ext>
+            </a:extLst>
+          </p:cNvPr>
+          <p:cNvSpPr>
+            <a:spLocks noGrp="1"/>
+          </p:cNvSpPr>
+          <p:nvPr>
+            <p:ph idx="1"/>
+          </p:nvPr>
+        </p:nvSpPr>
+        <p:spPr/>
+        <p:txBody>
+          <a:bodyPr/>
+          <a:lstStyle/>
+          <a:p>
+            <a:r>
+              <a:rPr lang="en-US" dirty="0"/>
+              <a:t>Test conditions:</a:t>
+            </a:r>
+          </a:p>
+          <a:p>
+            <a:pPr lvl="1"/>
+            <a:r>
+              <a:rPr lang="en-US" dirty="0"/>
+              <a:t>1 Week data: 1 May – 7 May 2020</a:t>
+            </a:r>
+          </a:p>
+          <a:p>
+            <a:pPr lvl="1"/>
+            <a:r>
+              <a:rPr lang="en-US" dirty="0"/>
+              <a:t>Charging stations: </a:t>
+            </a:r>
+          </a:p>
+          <a:p>
+            <a:endParaRPr lang="en-SG" dirty="0"/>
+          </a:p>
+        </p:txBody>
+      </p:sp>
+    </p:spTree>
+    <p:extLst>
+      <p:ext uri="{BB962C8B-B14F-4D97-AF65-F5344CB8AC3E}">
+        <p14:creationId xmlns:p14="http://schemas.microsoft.com/office/powerpoint/2010/main" val="4082033624"/>
+      </p:ext>
+    </p:extLst>
+  </p:cSld>
+  <p:clrMapOvr>
+    <a:masterClrMapping/>
+  </p:clrMapOvr>
+  <mc:AlternateContent xmlns:mc="http://schemas.openxmlformats.org/markup-compatibility/2006" xmlns:p14="http://schemas.microsoft.com/office/powerpoint/2010/main">
+    <mc:Choice Requires="p14">
+      <p:transition spd="med" p14:dur="700">
+        <p:fade/>
+      </p:transition>
+    </mc:Choice>
+    <mc:Fallback xmlns="">
+      <p:transition spd="med">
+        <p:fade/>
+      </p:transition>
+    </mc:Fallback>
+  </mc:AlternateContent>
 </p:sld>
 </file>
 
@@ -3903,4 +6211,619 @@
     </a:ext>
   </a:extLst>
 </a:theme>
+</file>
+
+<file path=ppt/theme/theme2.xml><?xml version="1.0" encoding="utf-8"?>
+<a:theme xmlns:a="http://schemas.openxmlformats.org/drawingml/2006/main" name="Office Theme">
+  <a:themeElements>
+    <a:clrScheme name="Office">
+      <a:dk1>
+        <a:sysClr val="windowText" lastClr="000000"/>
+      </a:dk1>
+      <a:lt1>
+        <a:sysClr val="window" lastClr="FFFFFF"/>
+      </a:lt1>
+      <a:dk2>
+        <a:srgbClr val="1F497D"/>
+      </a:dk2>
+      <a:lt2>
+        <a:srgbClr val="EEECE1"/>
+      </a:lt2>
+      <a:accent1>
+        <a:srgbClr val="4F81BD"/>
+      </a:accent1>
+      <a:accent2>
+        <a:srgbClr val="C0504D"/>
+      </a:accent2>
+      <a:accent3>
+        <a:srgbClr val="9BBB59"/>
+      </a:accent3>
+      <a:accent4>
+        <a:srgbClr val="8064A2"/>
+      </a:accent4>
+      <a:accent5>
+        <a:srgbClr val="4BACC6"/>
+      </a:accent5>
+      <a:accent6>
+        <a:srgbClr val="F79646"/>
+      </a:accent6>
+      <a:hlink>
+        <a:srgbClr val="0000FF"/>
+      </a:hlink>
+      <a:folHlink>
+        <a:srgbClr val="800080"/>
+      </a:folHlink>
+    </a:clrScheme>
+    <a:fontScheme name="Office">
+      <a:majorFont>
+        <a:latin typeface="Calibri"/>
+        <a:ea typeface=""/>
+        <a:cs typeface=""/>
+        <a:font script="Jpan" typeface="ＭＳ Ｐゴシック"/>
+        <a:font script="Hang" typeface="맑은 고딕"/>
+        <a:font script="Hans" typeface="宋体"/>
+        <a:font script="Hant" typeface="新細明體"/>
+        <a:font script="Arab" typeface="Times New Roman"/>
+        <a:font script="Hebr" typeface="Times New Roman"/>
+        <a:font script="Thai" typeface="Angsana New"/>
+        <a:font script="Ethi" typeface="Nyala"/>
+        <a:font script="Beng" typeface="Vrinda"/>
+        <a:font script="Gujr" typeface="Shruti"/>
+        <a:font script="Khmr" typeface="MoolBoran"/>
+        <a:font script="Knda" typeface="Tunga"/>
+        <a:font script="Guru" typeface="Raavi"/>
+        <a:font script="Cans" typeface="Euphemia"/>
+        <a:font script="Cher" typeface="Plantagenet Cherokee"/>
+        <a:font script="Yiii" typeface="Microsoft Yi Baiti"/>
+        <a:font script="Tibt" typeface="Microsoft Himalaya"/>
+        <a:font script="Thaa" typeface="MV Boli"/>
+        <a:font script="Deva" typeface="Mangal"/>
+        <a:font script="Telu" typeface="Gautami"/>
+        <a:font script="Taml" typeface="Latha"/>
+        <a:font script="Syrc" typeface="Estrangelo Edessa"/>
+        <a:font script="Orya" typeface="Kalinga"/>
+        <a:font script="Mlym" typeface="Kartika"/>
+        <a:font script="Laoo" typeface="DokChampa"/>
+        <a:font script="Sinh" typeface="Iskoola Pota"/>
+        <a:font script="Mong" typeface="Mongolian Baiti"/>
+        <a:font script="Viet" typeface="Times New Roman"/>
+        <a:font script="Uigh" typeface="Microsoft Uighur"/>
+        <a:font script="Geor" typeface="Sylfaen"/>
+      </a:majorFont>
+      <a:minorFont>
+        <a:latin typeface="Calibri"/>
+        <a:ea typeface=""/>
+        <a:cs typeface=""/>
+        <a:font script="Jpan" typeface="ＭＳ Ｐゴシック"/>
+        <a:font script="Hang" typeface="맑은 고딕"/>
+        <a:font script="Hans" typeface="宋体"/>
+        <a:font script="Hant" typeface="新細明體"/>
+        <a:font script="Arab" typeface="Arial"/>
+        <a:font script="Hebr" typeface="Arial"/>
+        <a:font script="Thai" typeface="Cordia New"/>
+        <a:font script="Ethi" typeface="Nyala"/>
+        <a:font script="Beng" typeface="Vrinda"/>
+        <a:font script="Gujr" typeface="Shruti"/>
+        <a:font script="Khmr" typeface="DaunPenh"/>
+        <a:font script="Knda" typeface="Tunga"/>
+        <a:font script="Guru" typeface="Raavi"/>
+        <a:font script="Cans" typeface="Euphemia"/>
+        <a:font script="Cher" typeface="Plantagenet Cherokee"/>
+        <a:font script="Yiii" typeface="Microsoft Yi Baiti"/>
+        <a:font script="Tibt" typeface="Microsoft Himalaya"/>
+        <a:font script="Thaa" typeface="MV Boli"/>
+        <a:font script="Deva" typeface="Mangal"/>
+        <a:font script="Telu" typeface="Gautami"/>
+        <a:font script="Taml" typeface="Latha"/>
+        <a:font script="Syrc" typeface="Estrangelo Edessa"/>
+        <a:font script="Orya" typeface="Kalinga"/>
+        <a:font script="Mlym" typeface="Kartika"/>
+        <a:font script="Laoo" typeface="DokChampa"/>
+        <a:font script="Sinh" typeface="Iskoola Pota"/>
+        <a:font script="Mong" typeface="Mongolian Baiti"/>
+        <a:font script="Viet" typeface="Arial"/>
+        <a:font script="Uigh" typeface="Microsoft Uighur"/>
+        <a:font script="Geor" typeface="Sylfaen"/>
+      </a:minorFont>
+    </a:fontScheme>
+    <a:fmtScheme name="Office">
+      <a:fillStyleLst>
+        <a:solidFill>
+          <a:schemeClr val="phClr"/>
+        </a:solidFill>
+        <a:gradFill rotWithShape="1">
+          <a:gsLst>
+            <a:gs pos="0">
+              <a:schemeClr val="phClr">
+                <a:tint val="50000"/>
+                <a:satMod val="300000"/>
+              </a:schemeClr>
+            </a:gs>
+            <a:gs pos="35000">
+              <a:schemeClr val="phClr">
+                <a:tint val="37000"/>
+                <a:satMod val="300000"/>
+              </a:schemeClr>
+            </a:gs>
+            <a:gs pos="100000">
+              <a:schemeClr val="phClr">
+                <a:tint val="15000"/>
+                <a:satMod val="350000"/>
+              </a:schemeClr>
+            </a:gs>
+          </a:gsLst>
+          <a:lin ang="16200000" scaled="1"/>
+        </a:gradFill>
+        <a:gradFill rotWithShape="1">
+          <a:gsLst>
+            <a:gs pos="0">
+              <a:schemeClr val="phClr">
+                <a:tint val="100000"/>
+                <a:shade val="100000"/>
+                <a:satMod val="130000"/>
+              </a:schemeClr>
+            </a:gs>
+            <a:gs pos="100000">
+              <a:schemeClr val="phClr">
+                <a:tint val="50000"/>
+                <a:shade val="100000"/>
+                <a:satMod val="350000"/>
+              </a:schemeClr>
+            </a:gs>
+          </a:gsLst>
+          <a:lin ang="16200000" scaled="0"/>
+        </a:gradFill>
+      </a:fillStyleLst>
+      <a:lnStyleLst>
+        <a:ln w="9525" cap="flat" cmpd="sng" algn="ctr">
+          <a:solidFill>
+            <a:schemeClr val="phClr">
+              <a:shade val="95000"/>
+              <a:satMod val="105000"/>
+            </a:schemeClr>
+          </a:solidFill>
+          <a:prstDash val="solid"/>
+        </a:ln>
+        <a:ln w="25400" cap="flat" cmpd="sng" algn="ctr">
+          <a:solidFill>
+            <a:schemeClr val="phClr"/>
+          </a:solidFill>
+          <a:prstDash val="solid"/>
+        </a:ln>
+        <a:ln w="38100" cap="flat" cmpd="sng" algn="ctr">
+          <a:solidFill>
+            <a:schemeClr val="phClr"/>
+          </a:solidFill>
+          <a:prstDash val="solid"/>
+        </a:ln>
+      </a:lnStyleLst>
+      <a:effectStyleLst>
+        <a:effectStyle>
+          <a:effectLst>
+            <a:outerShdw blurRad="40000" dist="20000" dir="5400000" rotWithShape="0">
+              <a:srgbClr val="000000">
+                <a:alpha val="38000"/>
+              </a:srgbClr>
+            </a:outerShdw>
+          </a:effectLst>
+        </a:effectStyle>
+        <a:effectStyle>
+          <a:effectLst>
+            <a:outerShdw blurRad="40000" dist="23000" dir="5400000" rotWithShape="0">
+              <a:srgbClr val="000000">
+                <a:alpha val="35000"/>
+              </a:srgbClr>
+            </a:outerShdw>
+          </a:effectLst>
+        </a:effectStyle>
+        <a:effectStyle>
+          <a:effectLst>
+            <a:outerShdw blurRad="40000" dist="23000" dir="5400000" rotWithShape="0">
+              <a:srgbClr val="000000">
+                <a:alpha val="35000"/>
+              </a:srgbClr>
+            </a:outerShdw>
+          </a:effectLst>
+          <a:scene3d>
+            <a:camera prst="orthographicFront">
+              <a:rot lat="0" lon="0" rev="0"/>
+            </a:camera>
+            <a:lightRig rig="threePt" dir="t">
+              <a:rot lat="0" lon="0" rev="1200000"/>
+            </a:lightRig>
+          </a:scene3d>
+          <a:sp3d>
+            <a:bevelT w="63500" h="25400"/>
+          </a:sp3d>
+        </a:effectStyle>
+      </a:effectStyleLst>
+      <a:bgFillStyleLst>
+        <a:solidFill>
+          <a:schemeClr val="phClr"/>
+        </a:solidFill>
+        <a:gradFill rotWithShape="1">
+          <a:gsLst>
+            <a:gs pos="0">
+              <a:schemeClr val="phClr">
+                <a:tint val="40000"/>
+                <a:satMod val="350000"/>
+              </a:schemeClr>
+            </a:gs>
+            <a:gs pos="40000">
+              <a:schemeClr val="phClr">
+                <a:tint val="45000"/>
+                <a:shade val="99000"/>
+                <a:satMod val="350000"/>
+              </a:schemeClr>
+            </a:gs>
+            <a:gs pos="100000">
+              <a:schemeClr val="phClr">
+                <a:shade val="20000"/>
+                <a:satMod val="255000"/>
+              </a:schemeClr>
+            </a:gs>
+          </a:gsLst>
+          <a:path path="circle">
+            <a:fillToRect l="50000" t="-80000" r="50000" b="180000"/>
+          </a:path>
+        </a:gradFill>
+        <a:gradFill rotWithShape="1">
+          <a:gsLst>
+            <a:gs pos="0">
+              <a:schemeClr val="phClr">
+                <a:tint val="80000"/>
+                <a:satMod val="300000"/>
+              </a:schemeClr>
+            </a:gs>
+            <a:gs pos="100000">
+              <a:schemeClr val="phClr">
+                <a:shade val="30000"/>
+                <a:satMod val="200000"/>
+              </a:schemeClr>
+            </a:gs>
+          </a:gsLst>
+          <a:path path="circle">
+            <a:fillToRect l="50000" t="50000" r="50000" b="50000"/>
+          </a:path>
+        </a:gradFill>
+      </a:bgFillStyleLst>
+    </a:fmtScheme>
+  </a:themeElements>
+  <a:objectDefaults>
+    <a:spDef>
+      <a:spPr/>
+      <a:bodyPr/>
+      <a:lstStyle/>
+      <a:style>
+        <a:lnRef idx="1">
+          <a:schemeClr val="accent1"/>
+        </a:lnRef>
+        <a:fillRef idx="3">
+          <a:schemeClr val="accent1"/>
+        </a:fillRef>
+        <a:effectRef idx="2">
+          <a:schemeClr val="accent1"/>
+        </a:effectRef>
+        <a:fontRef idx="minor">
+          <a:schemeClr val="lt1"/>
+        </a:fontRef>
+      </a:style>
+    </a:spDef>
+    <a:lnDef>
+      <a:spPr/>
+      <a:bodyPr/>
+      <a:lstStyle/>
+      <a:style>
+        <a:lnRef idx="2">
+          <a:schemeClr val="accent1"/>
+        </a:lnRef>
+        <a:fillRef idx="0">
+          <a:schemeClr val="accent1"/>
+        </a:fillRef>
+        <a:effectRef idx="1">
+          <a:schemeClr val="accent1"/>
+        </a:effectRef>
+        <a:fontRef idx="minor">
+          <a:schemeClr val="tx1"/>
+        </a:fontRef>
+      </a:style>
+    </a:lnDef>
+  </a:objectDefaults>
+  <a:extraClrSchemeLst/>
+</a:theme>
+</file>
+
+<file path=ppt/theme/theme3.xml><?xml version="1.0" encoding="utf-8"?>
+<a:theme xmlns:a="http://schemas.openxmlformats.org/drawingml/2006/main" name="Office Theme">
+  <a:themeElements>
+    <a:clrScheme name="Office">
+      <a:dk1>
+        <a:sysClr val="windowText" lastClr="000000"/>
+      </a:dk1>
+      <a:lt1>
+        <a:sysClr val="window" lastClr="FFFFFF"/>
+      </a:lt1>
+      <a:dk2>
+        <a:srgbClr val="44546A"/>
+      </a:dk2>
+      <a:lt2>
+        <a:srgbClr val="E7E6E6"/>
+      </a:lt2>
+      <a:accent1>
+        <a:srgbClr val="4472C4"/>
+      </a:accent1>
+      <a:accent2>
+        <a:srgbClr val="ED7D31"/>
+      </a:accent2>
+      <a:accent3>
+        <a:srgbClr val="A5A5A5"/>
+      </a:accent3>
+      <a:accent4>
+        <a:srgbClr val="FFC000"/>
+      </a:accent4>
+      <a:accent5>
+        <a:srgbClr val="5B9BD5"/>
+      </a:accent5>
+      <a:accent6>
+        <a:srgbClr val="70AD47"/>
+      </a:accent6>
+      <a:hlink>
+        <a:srgbClr val="0563C1"/>
+      </a:hlink>
+      <a:folHlink>
+        <a:srgbClr val="954F72"/>
+      </a:folHlink>
+    </a:clrScheme>
+    <a:fontScheme name="Office">
+      <a:majorFont>
+        <a:latin typeface="Calibri Light" panose="020F0302020204030204"/>
+        <a:ea typeface=""/>
+        <a:cs typeface=""/>
+        <a:font script="Jpan" typeface="游ゴシック Light"/>
+        <a:font script="Hang" typeface="맑은 고딕"/>
+        <a:font script="Hans" typeface="等线 Light"/>
+        <a:font script="Hant" typeface="新細明體"/>
+        <a:font script="Arab" typeface="Times New Roman"/>
+        <a:font script="Hebr" typeface="Times New Roman"/>
+        <a:font script="Thai" typeface="Angsana New"/>
+        <a:font script="Ethi" typeface="Nyala"/>
+        <a:font script="Beng" typeface="Vrinda"/>
+        <a:font script="Gujr" typeface="Shruti"/>
+        <a:font script="Khmr" typeface="MoolBoran"/>
+        <a:font script="Knda" typeface="Tunga"/>
+        <a:font script="Guru" typeface="Raavi"/>
+        <a:font script="Cans" typeface="Euphemia"/>
+        <a:font script="Cher" typeface="Plantagenet Cherokee"/>
+        <a:font script="Yiii" typeface="Microsoft Yi Baiti"/>
+        <a:font script="Tibt" typeface="Microsoft Himalaya"/>
+        <a:font script="Thaa" typeface="MV Boli"/>
+        <a:font script="Deva" typeface="Mangal"/>
+        <a:font script="Telu" typeface="Gautami"/>
+        <a:font script="Taml" typeface="Latha"/>
+        <a:font script="Syrc" typeface="Estrangelo Edessa"/>
+        <a:font script="Orya" typeface="Kalinga"/>
+        <a:font script="Mlym" typeface="Kartika"/>
+        <a:font script="Laoo" typeface="DokChampa"/>
+        <a:font script="Sinh" typeface="Iskoola Pota"/>
+        <a:font script="Mong" typeface="Mongolian Baiti"/>
+        <a:font script="Viet" typeface="Times New Roman"/>
+        <a:font script="Uigh" typeface="Microsoft Uighur"/>
+        <a:font script="Geor" typeface="Sylfaen"/>
+        <a:font script="Armn" typeface="Arial"/>
+        <a:font script="Bugi" typeface="Leelawadee UI"/>
+        <a:font script="Bopo" typeface="Microsoft JhengHei"/>
+        <a:font script="Java" typeface="Javanese Text"/>
+        <a:font script="Lisu" typeface="Segoe UI"/>
+        <a:font script="Mymr" typeface="Myanmar Text"/>
+        <a:font script="Nkoo" typeface="Ebrima"/>
+        <a:font script="Olck" typeface="Nirmala UI"/>
+        <a:font script="Osma" typeface="Ebrima"/>
+        <a:font script="Phag" typeface="Phagspa"/>
+        <a:font script="Syrn" typeface="Estrangelo Edessa"/>
+        <a:font script="Syrj" typeface="Estrangelo Edessa"/>
+        <a:font script="Syre" typeface="Estrangelo Edessa"/>
+        <a:font script="Sora" typeface="Nirmala UI"/>
+        <a:font script="Tale" typeface="Microsoft Tai Le"/>
+        <a:font script="Talu" typeface="Microsoft New Tai Lue"/>
+        <a:font script="Tfng" typeface="Ebrima"/>
+      </a:majorFont>
+      <a:minorFont>
+        <a:latin typeface="Calibri" panose="020F0502020204030204"/>
+        <a:ea typeface=""/>
+        <a:cs typeface=""/>
+        <a:font script="Jpan" typeface="游ゴシック"/>
+        <a:font script="Hang" typeface="맑은 고딕"/>
+        <a:font script="Hans" typeface="等线"/>
+        <a:font script="Hant" typeface="新細明體"/>
+        <a:font script="Arab" typeface="Arial"/>
+        <a:font script="Hebr" typeface="Arial"/>
+        <a:font script="Thai" typeface="Cordia New"/>
+        <a:font script="Ethi" typeface="Nyala"/>
+        <a:font script="Beng" typeface="Vrinda"/>
+        <a:font script="Gujr" typeface="Shruti"/>
+        <a:font script="Khmr" typeface="DaunPenh"/>
+        <a:font script="Knda" typeface="Tunga"/>
+        <a:font script="Guru" typeface="Raavi"/>
+        <a:font script="Cans" typeface="Euphemia"/>
+        <a:font script="Cher" typeface="Plantagenet Cherokee"/>
+        <a:font script="Yiii" typeface="Microsoft Yi Baiti"/>
+        <a:font script="Tibt" typeface="Microsoft Himalaya"/>
+        <a:font script="Thaa" typeface="MV Boli"/>
+        <a:font script="Deva" typeface="Mangal"/>
+        <a:font script="Telu" typeface="Gautami"/>
+        <a:font script="Taml" typeface="Latha"/>
+        <a:font script="Syrc" typeface="Estrangelo Edessa"/>
+        <a:font script="Orya" typeface="Kalinga"/>
+        <a:font script="Mlym" typeface="Kartika"/>
+        <a:font script="Laoo" typeface="DokChampa"/>
+        <a:font script="Sinh" typeface="Iskoola Pota"/>
+        <a:font script="Mong" typeface="Mongolian Baiti"/>
+        <a:font script="Viet" typeface="Arial"/>
+        <a:font script="Uigh" typeface="Microsoft Uighur"/>
+        <a:font script="Geor" typeface="Sylfaen"/>
+        <a:font script="Armn" typeface="Arial"/>
+        <a:font script="Bugi" typeface="Leelawadee UI"/>
+        <a:font script="Bopo" typeface="Microsoft JhengHei"/>
+        <a:font script="Java" typeface="Javanese Text"/>
+        <a:font script="Lisu" typeface="Segoe UI"/>
+        <a:font script="Mymr" typeface="Myanmar Text"/>
+        <a:font script="Nkoo" typeface="Ebrima"/>
+        <a:font script="Olck" typeface="Nirmala UI"/>
+        <a:font script="Osma" typeface="Ebrima"/>
+        <a:font script="Phag" typeface="Phagspa"/>
+        <a:font script="Syrn" typeface="Estrangelo Edessa"/>
+        <a:font script="Syrj" typeface="Estrangelo Edessa"/>
+        <a:font script="Syre" typeface="Estrangelo Edessa"/>
+        <a:font script="Sora" typeface="Nirmala UI"/>
+        <a:font script="Tale" typeface="Microsoft Tai Le"/>
+        <a:font script="Talu" typeface="Microsoft New Tai Lue"/>
+        <a:font script="Tfng" typeface="Ebrima"/>
+      </a:minorFont>
+    </a:fontScheme>
+    <a:fmtScheme name="Office">
+      <a:fillStyleLst>
+        <a:solidFill>
+          <a:schemeClr val="phClr"/>
+        </a:solidFill>
+        <a:gradFill rotWithShape="1">
+          <a:gsLst>
+            <a:gs pos="0">
+              <a:schemeClr val="phClr">
+                <a:lumMod val="110000"/>
+                <a:satMod val="105000"/>
+                <a:tint val="67000"/>
+              </a:schemeClr>
+            </a:gs>
+            <a:gs pos="50000">
+              <a:schemeClr val="phClr">
+                <a:lumMod val="105000"/>
+                <a:satMod val="103000"/>
+                <a:tint val="73000"/>
+              </a:schemeClr>
+            </a:gs>
+            <a:gs pos="100000">
+              <a:schemeClr val="phClr">
+                <a:lumMod val="105000"/>
+                <a:satMod val="109000"/>
+                <a:tint val="81000"/>
+              </a:schemeClr>
+            </a:gs>
+          </a:gsLst>
+          <a:lin ang="5400000" scaled="0"/>
+        </a:gradFill>
+        <a:gradFill rotWithShape="1">
+          <a:gsLst>
+            <a:gs pos="0">
+              <a:schemeClr val="phClr">
+                <a:satMod val="103000"/>
+                <a:lumMod val="102000"/>
+                <a:tint val="94000"/>
+              </a:schemeClr>
+            </a:gs>
+            <a:gs pos="50000">
+              <a:schemeClr val="phClr">
+                <a:satMod val="110000"/>
+                <a:lumMod val="100000"/>
+                <a:shade val="100000"/>
+              </a:schemeClr>
+            </a:gs>
+            <a:gs pos="100000">
+              <a:schemeClr val="phClr">
+                <a:lumMod val="99000"/>
+                <a:satMod val="120000"/>
+                <a:shade val="78000"/>
+              </a:schemeClr>
+            </a:gs>
+          </a:gsLst>
+          <a:lin ang="5400000" scaled="0"/>
+        </a:gradFill>
+      </a:fillStyleLst>
+      <a:lnStyleLst>
+        <a:ln w="6350" cap="flat" cmpd="sng" algn="ctr">
+          <a:solidFill>
+            <a:schemeClr val="phClr"/>
+          </a:solidFill>
+          <a:prstDash val="solid"/>
+          <a:miter lim="800000"/>
+        </a:ln>
+        <a:ln w="12700" cap="flat" cmpd="sng" algn="ctr">
+          <a:solidFill>
+            <a:schemeClr val="phClr"/>
+          </a:solidFill>
+          <a:prstDash val="solid"/>
+          <a:miter lim="800000"/>
+        </a:ln>
+        <a:ln w="19050" cap="flat" cmpd="sng" algn="ctr">
+          <a:solidFill>
+            <a:schemeClr val="phClr"/>
+          </a:solidFill>
+          <a:prstDash val="solid"/>
+          <a:miter lim="800000"/>
+        </a:ln>
+      </a:lnStyleLst>
+      <a:effectStyleLst>
+        <a:effectStyle>
+          <a:effectLst/>
+        </a:effectStyle>
+        <a:effectStyle>
+          <a:effectLst/>
+        </a:effectStyle>
+        <a:effectStyle>
+          <a:effectLst>
+            <a:outerShdw blurRad="57150" dist="19050" dir="5400000" algn="ctr" rotWithShape="0">
+              <a:srgbClr val="000000">
+                <a:alpha val="63000"/>
+              </a:srgbClr>
+            </a:outerShdw>
+          </a:effectLst>
+        </a:effectStyle>
+      </a:effectStyleLst>
+      <a:bgFillStyleLst>
+        <a:solidFill>
+          <a:schemeClr val="phClr"/>
+        </a:solidFill>
+        <a:solidFill>
+          <a:schemeClr val="phClr">
+            <a:tint val="95000"/>
+            <a:satMod val="170000"/>
+          </a:schemeClr>
+        </a:solidFill>
+        <a:gradFill rotWithShape="1">
+          <a:gsLst>
+            <a:gs pos="0">
+              <a:schemeClr val="phClr">
+                <a:tint val="93000"/>
+                <a:satMod val="150000"/>
+                <a:shade val="98000"/>
+                <a:lumMod val="102000"/>
+              </a:schemeClr>
+            </a:gs>
+            <a:gs pos="50000">
+              <a:schemeClr val="phClr">
+                <a:tint val="98000"/>
+                <a:satMod val="130000"/>
+                <a:shade val="90000"/>
+                <a:lumMod val="103000"/>
+              </a:schemeClr>
+            </a:gs>
+            <a:gs pos="100000">
+              <a:schemeClr val="phClr">
+                <a:shade val="63000"/>
+                <a:satMod val="120000"/>
+              </a:schemeClr>
+            </a:gs>
+          </a:gsLst>
+          <a:lin ang="5400000" scaled="0"/>
+        </a:gradFill>
+      </a:bgFillStyleLst>
+    </a:fmtScheme>
+  </a:themeElements>
+  <a:objectDefaults/>
+  <a:extraClrSchemeLst/>
+  <a:extLst>
+    <a:ext uri="{05A4C25C-085E-4340-85A3-A5531E510DB2}">
+      <thm15:themeFamily xmlns:thm15="http://schemas.microsoft.com/office/thememl/2012/main" name="Office Theme" id="{62F939B6-93AF-4DB8-9C6B-D6C7DFDC589F}" vid="{4A3C46E8-61CC-4603-A589-7422A47A8E4A}"/>
+    </a:ext>
+  </a:extLst>
+</a:theme>
 </file>
</xml_diff>